<commit_message>
se sube diapositivas de la integradora
</commit_message>
<xml_diff>
--- a/9°A/Integradora/diapositiva/SM-ROOT_APPMO-SP.pptx
+++ b/9°A/Integradora/diapositiva/SM-ROOT_APPMO-SP.pptx
@@ -11,6 +11,22 @@
     <p:sldId id="259" r:id="rId5"/>
     <p:sldId id="260" r:id="rId6"/>
     <p:sldId id="261" r:id="rId7"/>
+    <p:sldId id="262" r:id="rId8"/>
+    <p:sldId id="264" r:id="rId9"/>
+    <p:sldId id="265" r:id="rId10"/>
+    <p:sldId id="263" r:id="rId11"/>
+    <p:sldId id="266" r:id="rId12"/>
+    <p:sldId id="267" r:id="rId13"/>
+    <p:sldId id="268" r:id="rId14"/>
+    <p:sldId id="269" r:id="rId15"/>
+    <p:sldId id="270" r:id="rId16"/>
+    <p:sldId id="271" r:id="rId17"/>
+    <p:sldId id="272" r:id="rId18"/>
+    <p:sldId id="273" r:id="rId19"/>
+    <p:sldId id="274" r:id="rId20"/>
+    <p:sldId id="276" r:id="rId21"/>
+    <p:sldId id="275" r:id="rId22"/>
+    <p:sldId id="277" r:id="rId23"/>
   </p:sldIdLst>
   <p:sldSz cx="12192000" cy="6858000"/>
   <p:notesSz cx="6858000" cy="9144000"/>
@@ -109,6 +125,11 @@
       </a:defRPr>
     </a:lvl9pPr>
   </p:defaultTextStyle>
+  <p:extLst>
+    <p:ext uri="{EFAFB233-063F-42B5-8137-9DF3F51BA10A}">
+      <p15:sldGuideLst xmlns:p15="http://schemas.microsoft.com/office/powerpoint/2012/main"/>
+    </p:ext>
+  </p:extLst>
 </p:presentation>
 </file>
 
@@ -4382,6 +4403,1431 @@
 </p:sld>
 </file>
 
+<file path=ppt/slides/slide10.xml><?xml version="1.0" encoding="utf-8"?>
+<p:sld xmlns:a="http://schemas.openxmlformats.org/drawingml/2006/main" xmlns:r="http://schemas.openxmlformats.org/officeDocument/2006/relationships" xmlns:p="http://schemas.openxmlformats.org/presentationml/2006/main">
+  <p:cSld>
+    <p:spTree>
+      <p:nvGrpSpPr>
+        <p:cNvPr id="1" name=""/>
+        <p:cNvGrpSpPr/>
+        <p:nvPr/>
+      </p:nvGrpSpPr>
+      <p:grpSpPr>
+        <a:xfrm>
+          <a:off x="0" y="0"/>
+          <a:ext cx="0" cy="0"/>
+          <a:chOff x="0" y="0"/>
+          <a:chExt cx="0" cy="0"/>
+        </a:xfrm>
+      </p:grpSpPr>
+      <p:sp>
+        <p:nvSpPr>
+          <p:cNvPr id="2" name="Título 1"/>
+          <p:cNvSpPr>
+            <a:spLocks noGrp="1"/>
+          </p:cNvSpPr>
+          <p:nvPr>
+            <p:ph type="title"/>
+          </p:nvPr>
+        </p:nvSpPr>
+        <p:spPr>
+          <a:xfrm>
+            <a:off x="2163065" y="316345"/>
+            <a:ext cx="9601200" cy="1485900"/>
+          </a:xfrm>
+        </p:spPr>
+        <p:txBody>
+          <a:bodyPr>
+            <a:normAutofit/>
+          </a:bodyPr>
+          <a:lstStyle/>
+          <a:p>
+            <a:pPr algn="ctr"/>
+            <a:r>
+              <a:rPr lang="es-MX" sz="4000" dirty="0" smtClean="0"/>
+              <a:t>DEFINICIÓN DE ACTIVIDADES, ROLES Y MATRIZ DE RESPONSABILIDAD.</a:t>
+            </a:r>
+            <a:endParaRPr lang="es-MX" sz="4000" dirty="0"/>
+          </a:p>
+        </p:txBody>
+      </p:sp>
+      <p:pic>
+        <p:nvPicPr>
+          <p:cNvPr id="4" name="Marcador de contenido 3"/>
+          <p:cNvPicPr>
+            <a:picLocks noGrp="1" noChangeAspect="1"/>
+          </p:cNvPicPr>
+          <p:nvPr>
+            <p:ph idx="1"/>
+          </p:nvPr>
+        </p:nvPicPr>
+        <p:blipFill>
+          <a:blip r:embed="rId2"/>
+          <a:stretch>
+            <a:fillRect/>
+          </a:stretch>
+        </p:blipFill>
+        <p:spPr>
+          <a:xfrm>
+            <a:off x="4284566" y="2701634"/>
+            <a:ext cx="5210416" cy="3971263"/>
+          </a:xfrm>
+          <a:prstGeom prst="rect">
+            <a:avLst/>
+          </a:prstGeom>
+        </p:spPr>
+      </p:pic>
+      <p:sp>
+        <p:nvSpPr>
+          <p:cNvPr id="6" name="CuadroTexto 5"/>
+          <p:cNvSpPr txBox="1"/>
+          <p:nvPr/>
+        </p:nvSpPr>
+        <p:spPr>
+          <a:xfrm>
+            <a:off x="5467374" y="2201140"/>
+            <a:ext cx="2844800" cy="369332"/>
+          </a:xfrm>
+          <a:prstGeom prst="rect">
+            <a:avLst/>
+          </a:prstGeom>
+          <a:noFill/>
+        </p:spPr>
+        <p:txBody>
+          <a:bodyPr wrap="square" rtlCol="0">
+            <a:spAutoFit/>
+          </a:bodyPr>
+          <a:lstStyle/>
+          <a:p>
+            <a:r>
+              <a:rPr lang="es-MX" dirty="0" smtClean="0"/>
+              <a:t>LISTA DE STAKEHOLDERS</a:t>
+            </a:r>
+            <a:endParaRPr lang="es-MX" dirty="0"/>
+          </a:p>
+        </p:txBody>
+      </p:sp>
+    </p:spTree>
+    <p:extLst>
+      <p:ext uri="{BB962C8B-B14F-4D97-AF65-F5344CB8AC3E}">
+        <p14:creationId xmlns:p14="http://schemas.microsoft.com/office/powerpoint/2010/main" val="2614830262"/>
+      </p:ext>
+    </p:extLst>
+  </p:cSld>
+  <p:clrMapOvr>
+    <a:masterClrMapping/>
+  </p:clrMapOvr>
+</p:sld>
+</file>
+
+<file path=ppt/slides/slide11.xml><?xml version="1.0" encoding="utf-8"?>
+<p:sld xmlns:a="http://schemas.openxmlformats.org/drawingml/2006/main" xmlns:r="http://schemas.openxmlformats.org/officeDocument/2006/relationships" xmlns:p="http://schemas.openxmlformats.org/presentationml/2006/main">
+  <p:cSld>
+    <p:spTree>
+      <p:nvGrpSpPr>
+        <p:cNvPr id="1" name=""/>
+        <p:cNvGrpSpPr/>
+        <p:nvPr/>
+      </p:nvGrpSpPr>
+      <p:grpSpPr>
+        <a:xfrm>
+          <a:off x="0" y="0"/>
+          <a:ext cx="0" cy="0"/>
+          <a:chOff x="0" y="0"/>
+          <a:chExt cx="0" cy="0"/>
+        </a:xfrm>
+      </p:grpSpPr>
+      <p:pic>
+        <p:nvPicPr>
+          <p:cNvPr id="4" name="Marcador de contenido 3"/>
+          <p:cNvPicPr>
+            <a:picLocks noGrp="1" noChangeAspect="1"/>
+          </p:cNvPicPr>
+          <p:nvPr>
+            <p:ph idx="1"/>
+          </p:nvPr>
+        </p:nvPicPr>
+        <p:blipFill>
+          <a:blip r:embed="rId2"/>
+          <a:stretch>
+            <a:fillRect/>
+          </a:stretch>
+        </p:blipFill>
+        <p:spPr>
+          <a:xfrm>
+            <a:off x="6530109" y="430828"/>
+            <a:ext cx="5403272" cy="3059918"/>
+          </a:xfrm>
+          <a:prstGeom prst="rect">
+            <a:avLst/>
+          </a:prstGeom>
+        </p:spPr>
+      </p:pic>
+      <p:pic>
+        <p:nvPicPr>
+          <p:cNvPr id="5" name="Imagen 4"/>
+          <p:cNvPicPr>
+            <a:picLocks noChangeAspect="1"/>
+          </p:cNvPicPr>
+          <p:nvPr/>
+        </p:nvPicPr>
+        <p:blipFill>
+          <a:blip r:embed="rId3"/>
+          <a:stretch>
+            <a:fillRect/>
+          </a:stretch>
+        </p:blipFill>
+        <p:spPr>
+          <a:xfrm>
+            <a:off x="6530109" y="3490746"/>
+            <a:ext cx="5403272" cy="3071763"/>
+          </a:xfrm>
+          <a:prstGeom prst="rect">
+            <a:avLst/>
+          </a:prstGeom>
+        </p:spPr>
+      </p:pic>
+      <p:pic>
+        <p:nvPicPr>
+          <p:cNvPr id="6" name="Imagen 5"/>
+          <p:cNvPicPr>
+            <a:picLocks noChangeAspect="1"/>
+          </p:cNvPicPr>
+          <p:nvPr/>
+        </p:nvPicPr>
+        <p:blipFill rotWithShape="1">
+          <a:blip r:embed="rId4"/>
+          <a:srcRect t="1530"/>
+          <a:stretch/>
+        </p:blipFill>
+        <p:spPr>
+          <a:xfrm>
+            <a:off x="1025236" y="1013355"/>
+            <a:ext cx="5139459" cy="2477391"/>
+          </a:xfrm>
+          <a:prstGeom prst="rect">
+            <a:avLst/>
+          </a:prstGeom>
+        </p:spPr>
+      </p:pic>
+      <p:sp>
+        <p:nvSpPr>
+          <p:cNvPr id="8" name="CuadroTexto 7"/>
+          <p:cNvSpPr txBox="1"/>
+          <p:nvPr/>
+        </p:nvSpPr>
+        <p:spPr>
+          <a:xfrm>
+            <a:off x="2080202" y="430828"/>
+            <a:ext cx="2844800" cy="369332"/>
+          </a:xfrm>
+          <a:prstGeom prst="rect">
+            <a:avLst/>
+          </a:prstGeom>
+          <a:noFill/>
+        </p:spPr>
+        <p:txBody>
+          <a:bodyPr wrap="square" rtlCol="0">
+            <a:spAutoFit/>
+          </a:bodyPr>
+          <a:lstStyle/>
+          <a:p>
+            <a:pPr algn="ctr"/>
+            <a:r>
+              <a:rPr lang="es-MX" dirty="0" smtClean="0"/>
+              <a:t>MATRIZ RACI</a:t>
+            </a:r>
+            <a:endParaRPr lang="es-MX" dirty="0"/>
+          </a:p>
+        </p:txBody>
+      </p:sp>
+    </p:spTree>
+    <p:extLst>
+      <p:ext uri="{BB962C8B-B14F-4D97-AF65-F5344CB8AC3E}">
+        <p14:creationId xmlns:p14="http://schemas.microsoft.com/office/powerpoint/2010/main" val="3920510371"/>
+      </p:ext>
+    </p:extLst>
+  </p:cSld>
+  <p:clrMapOvr>
+    <a:masterClrMapping/>
+  </p:clrMapOvr>
+</p:sld>
+</file>
+
+<file path=ppt/slides/slide12.xml><?xml version="1.0" encoding="utf-8"?>
+<p:sld xmlns:a="http://schemas.openxmlformats.org/drawingml/2006/main" xmlns:r="http://schemas.openxmlformats.org/officeDocument/2006/relationships" xmlns:p="http://schemas.openxmlformats.org/presentationml/2006/main">
+  <p:cSld>
+    <p:spTree>
+      <p:nvGrpSpPr>
+        <p:cNvPr id="1" name=""/>
+        <p:cNvGrpSpPr/>
+        <p:nvPr/>
+      </p:nvGrpSpPr>
+      <p:grpSpPr>
+        <a:xfrm>
+          <a:off x="0" y="0"/>
+          <a:ext cx="0" cy="0"/>
+          <a:chOff x="0" y="0"/>
+          <a:chExt cx="0" cy="0"/>
+        </a:xfrm>
+      </p:grpSpPr>
+      <p:sp>
+        <p:nvSpPr>
+          <p:cNvPr id="2" name="Título 1"/>
+          <p:cNvSpPr>
+            <a:spLocks noGrp="1"/>
+          </p:cNvSpPr>
+          <p:nvPr>
+            <p:ph type="title"/>
+          </p:nvPr>
+        </p:nvSpPr>
+        <p:spPr/>
+        <p:txBody>
+          <a:bodyPr/>
+          <a:lstStyle/>
+          <a:p>
+            <a:pPr algn="ctr"/>
+            <a:r>
+              <a:rPr lang="es-MX" dirty="0" smtClean="0"/>
+              <a:t>PROGRAMACIÓN DE ACTIVIDADES</a:t>
+            </a:r>
+            <a:endParaRPr lang="es-MX" dirty="0"/>
+          </a:p>
+        </p:txBody>
+      </p:sp>
+      <p:pic>
+        <p:nvPicPr>
+          <p:cNvPr id="4" name="Marcador de contenido 3"/>
+          <p:cNvPicPr>
+            <a:picLocks noGrp="1" noChangeAspect="1"/>
+          </p:cNvPicPr>
+          <p:nvPr>
+            <p:ph idx="1"/>
+          </p:nvPr>
+        </p:nvPicPr>
+        <p:blipFill rotWithShape="1">
+          <a:blip r:embed="rId2">
+            <a:extLst>
+              <a:ext uri="{28A0092B-C50C-407E-A947-70E740481C1C}">
+                <a14:useLocalDpi xmlns:a14="http://schemas.microsoft.com/office/drawing/2010/main" val="0"/>
+              </a:ext>
+            </a:extLst>
+          </a:blip>
+          <a:srcRect t="5851" r="35647"/>
+          <a:stretch/>
+        </p:blipFill>
+        <p:spPr>
+          <a:xfrm>
+            <a:off x="2873226" y="2079336"/>
+            <a:ext cx="6597947" cy="4228360"/>
+          </a:xfrm>
+        </p:spPr>
+      </p:pic>
+    </p:spTree>
+    <p:extLst>
+      <p:ext uri="{BB962C8B-B14F-4D97-AF65-F5344CB8AC3E}">
+        <p14:creationId xmlns:p14="http://schemas.microsoft.com/office/powerpoint/2010/main" val="1757424061"/>
+      </p:ext>
+    </p:extLst>
+  </p:cSld>
+  <p:clrMapOvr>
+    <a:masterClrMapping/>
+  </p:clrMapOvr>
+</p:sld>
+</file>
+
+<file path=ppt/slides/slide13.xml><?xml version="1.0" encoding="utf-8"?>
+<p:sld xmlns:a="http://schemas.openxmlformats.org/drawingml/2006/main" xmlns:r="http://schemas.openxmlformats.org/officeDocument/2006/relationships" xmlns:p="http://schemas.openxmlformats.org/presentationml/2006/main">
+  <p:cSld>
+    <p:spTree>
+      <p:nvGrpSpPr>
+        <p:cNvPr id="1" name=""/>
+        <p:cNvGrpSpPr/>
+        <p:nvPr/>
+      </p:nvGrpSpPr>
+      <p:grpSpPr>
+        <a:xfrm>
+          <a:off x="0" y="0"/>
+          <a:ext cx="0" cy="0"/>
+          <a:chOff x="0" y="0"/>
+          <a:chExt cx="0" cy="0"/>
+        </a:xfrm>
+      </p:grpSpPr>
+      <p:sp>
+        <p:nvSpPr>
+          <p:cNvPr id="2" name="Título 1"/>
+          <p:cNvSpPr>
+            <a:spLocks noGrp="1"/>
+          </p:cNvSpPr>
+          <p:nvPr>
+            <p:ph type="title"/>
+          </p:nvPr>
+        </p:nvSpPr>
+        <p:spPr/>
+        <p:txBody>
+          <a:bodyPr>
+            <a:normAutofit/>
+          </a:bodyPr>
+          <a:lstStyle/>
+          <a:p>
+            <a:pPr algn="ctr"/>
+            <a:r>
+              <a:rPr lang="es-MX" sz="4000" dirty="0" smtClean="0"/>
+              <a:t>ESTIMACIÓN DE RECURSOS Y COSTOS.</a:t>
+            </a:r>
+            <a:endParaRPr lang="es-MX" sz="4000" dirty="0"/>
+          </a:p>
+        </p:txBody>
+      </p:sp>
+      <p:pic>
+        <p:nvPicPr>
+          <p:cNvPr id="4" name="Marcador de contenido 3"/>
+          <p:cNvPicPr>
+            <a:picLocks noGrp="1" noChangeAspect="1"/>
+          </p:cNvPicPr>
+          <p:nvPr>
+            <p:ph idx="1"/>
+          </p:nvPr>
+        </p:nvPicPr>
+        <p:blipFill>
+          <a:blip r:embed="rId2"/>
+          <a:stretch>
+            <a:fillRect/>
+          </a:stretch>
+        </p:blipFill>
+        <p:spPr>
+          <a:xfrm>
+            <a:off x="4470170" y="2171700"/>
+            <a:ext cx="5685844" cy="2466440"/>
+          </a:xfrm>
+          <a:prstGeom prst="rect">
+            <a:avLst/>
+          </a:prstGeom>
+        </p:spPr>
+      </p:pic>
+      <p:pic>
+        <p:nvPicPr>
+          <p:cNvPr id="5" name="Imagen 4"/>
+          <p:cNvPicPr>
+            <a:picLocks noChangeAspect="1"/>
+          </p:cNvPicPr>
+          <p:nvPr/>
+        </p:nvPicPr>
+        <p:blipFill>
+          <a:blip r:embed="rId3"/>
+          <a:stretch>
+            <a:fillRect/>
+          </a:stretch>
+        </p:blipFill>
+        <p:spPr>
+          <a:xfrm>
+            <a:off x="4470170" y="4638139"/>
+            <a:ext cx="5654674" cy="1756558"/>
+          </a:xfrm>
+          <a:prstGeom prst="rect">
+            <a:avLst/>
+          </a:prstGeom>
+        </p:spPr>
+      </p:pic>
+      <p:pic>
+        <p:nvPicPr>
+          <p:cNvPr id="6" name="Imagen 5"/>
+          <p:cNvPicPr>
+            <a:picLocks noChangeAspect="1"/>
+          </p:cNvPicPr>
+          <p:nvPr/>
+        </p:nvPicPr>
+        <p:blipFill rotWithShape="1">
+          <a:blip r:embed="rId4"/>
+          <a:srcRect l="1400" t="603" r="-1" b="1"/>
+          <a:stretch/>
+        </p:blipFill>
+        <p:spPr>
+          <a:xfrm>
+            <a:off x="2028641" y="2550081"/>
+            <a:ext cx="1589474" cy="2630417"/>
+          </a:xfrm>
+          <a:prstGeom prst="rect">
+            <a:avLst/>
+          </a:prstGeom>
+          <a:ln>
+            <a:solidFill>
+              <a:schemeClr val="tx1"/>
+            </a:solidFill>
+          </a:ln>
+        </p:spPr>
+      </p:pic>
+      <p:pic>
+        <p:nvPicPr>
+          <p:cNvPr id="7" name="Imagen 6"/>
+          <p:cNvPicPr>
+            <a:picLocks noChangeAspect="1"/>
+          </p:cNvPicPr>
+          <p:nvPr/>
+        </p:nvPicPr>
+        <p:blipFill>
+          <a:blip r:embed="rId5"/>
+          <a:stretch>
+            <a:fillRect/>
+          </a:stretch>
+        </p:blipFill>
+        <p:spPr>
+          <a:xfrm>
+            <a:off x="1046885" y="5558879"/>
+            <a:ext cx="3423285" cy="817271"/>
+          </a:xfrm>
+          <a:prstGeom prst="rect">
+            <a:avLst/>
+          </a:prstGeom>
+        </p:spPr>
+      </p:pic>
+      <p:sp>
+        <p:nvSpPr>
+          <p:cNvPr id="9" name="CuadroTexto 8"/>
+          <p:cNvSpPr txBox="1"/>
+          <p:nvPr/>
+        </p:nvSpPr>
+        <p:spPr>
+          <a:xfrm>
+            <a:off x="5905500" y="1754679"/>
+            <a:ext cx="3345181" cy="369332"/>
+          </a:xfrm>
+          <a:prstGeom prst="rect">
+            <a:avLst/>
+          </a:prstGeom>
+          <a:noFill/>
+        </p:spPr>
+        <p:txBody>
+          <a:bodyPr wrap="square" rtlCol="0">
+            <a:spAutoFit/>
+          </a:bodyPr>
+          <a:lstStyle/>
+          <a:p>
+            <a:r>
+              <a:rPr lang="es-MX" dirty="0" smtClean="0"/>
+              <a:t>JUSTIFICACIÓN DE COSTOS</a:t>
+            </a:r>
+            <a:endParaRPr lang="es-MX" dirty="0"/>
+          </a:p>
+        </p:txBody>
+      </p:sp>
+    </p:spTree>
+    <p:extLst>
+      <p:ext uri="{BB962C8B-B14F-4D97-AF65-F5344CB8AC3E}">
+        <p14:creationId xmlns:p14="http://schemas.microsoft.com/office/powerpoint/2010/main" val="3230040892"/>
+      </p:ext>
+    </p:extLst>
+  </p:cSld>
+  <p:clrMapOvr>
+    <a:masterClrMapping/>
+  </p:clrMapOvr>
+  <p:timing>
+    <p:tnLst>
+      <p:par>
+        <p:cTn id="1" dur="indefinite" restart="never" nodeType="tmRoot"/>
+      </p:par>
+    </p:tnLst>
+  </p:timing>
+</p:sld>
+</file>
+
+<file path=ppt/slides/slide14.xml><?xml version="1.0" encoding="utf-8"?>
+<p:sld xmlns:a="http://schemas.openxmlformats.org/drawingml/2006/main" xmlns:r="http://schemas.openxmlformats.org/officeDocument/2006/relationships" xmlns:p="http://schemas.openxmlformats.org/presentationml/2006/main">
+  <p:cSld>
+    <p:spTree>
+      <p:nvGrpSpPr>
+        <p:cNvPr id="1" name=""/>
+        <p:cNvGrpSpPr/>
+        <p:nvPr/>
+      </p:nvGrpSpPr>
+      <p:grpSpPr>
+        <a:xfrm>
+          <a:off x="0" y="0"/>
+          <a:ext cx="0" cy="0"/>
+          <a:chOff x="0" y="0"/>
+          <a:chExt cx="0" cy="0"/>
+        </a:xfrm>
+      </p:grpSpPr>
+      <p:sp>
+        <p:nvSpPr>
+          <p:cNvPr id="2" name="Título 1"/>
+          <p:cNvSpPr>
+            <a:spLocks noGrp="1"/>
+          </p:cNvSpPr>
+          <p:nvPr>
+            <p:ph type="title"/>
+          </p:nvPr>
+        </p:nvSpPr>
+        <p:spPr/>
+        <p:txBody>
+          <a:bodyPr>
+            <a:normAutofit/>
+          </a:bodyPr>
+          <a:lstStyle/>
+          <a:p>
+            <a:pPr algn="ctr"/>
+            <a:r>
+              <a:rPr lang="es-MX" sz="3600" dirty="0" smtClean="0"/>
+              <a:t>ANÁLISIS DE RIESGOS</a:t>
+            </a:r>
+            <a:endParaRPr lang="es-MX" sz="3600" dirty="0"/>
+          </a:p>
+        </p:txBody>
+      </p:sp>
+      <p:pic>
+        <p:nvPicPr>
+          <p:cNvPr id="4" name="Marcador de contenido 3"/>
+          <p:cNvPicPr>
+            <a:picLocks noGrp="1" noChangeAspect="1"/>
+          </p:cNvPicPr>
+          <p:nvPr>
+            <p:ph idx="1"/>
+          </p:nvPr>
+        </p:nvPicPr>
+        <p:blipFill>
+          <a:blip r:embed="rId2"/>
+          <a:stretch>
+            <a:fillRect/>
+          </a:stretch>
+        </p:blipFill>
+        <p:spPr>
+          <a:xfrm>
+            <a:off x="3634740" y="1684020"/>
+            <a:ext cx="5158740" cy="2328281"/>
+          </a:xfrm>
+          <a:prstGeom prst="rect">
+            <a:avLst/>
+          </a:prstGeom>
+        </p:spPr>
+      </p:pic>
+      <p:pic>
+        <p:nvPicPr>
+          <p:cNvPr id="5" name="Imagen 4"/>
+          <p:cNvPicPr>
+            <a:picLocks noChangeAspect="1"/>
+          </p:cNvPicPr>
+          <p:nvPr/>
+        </p:nvPicPr>
+        <p:blipFill>
+          <a:blip r:embed="rId3"/>
+          <a:stretch>
+            <a:fillRect/>
+          </a:stretch>
+        </p:blipFill>
+        <p:spPr>
+          <a:xfrm>
+            <a:off x="3634740" y="4012301"/>
+            <a:ext cx="5158740" cy="2012274"/>
+          </a:xfrm>
+          <a:prstGeom prst="rect">
+            <a:avLst/>
+          </a:prstGeom>
+        </p:spPr>
+      </p:pic>
+    </p:spTree>
+    <p:extLst>
+      <p:ext uri="{BB962C8B-B14F-4D97-AF65-F5344CB8AC3E}">
+        <p14:creationId xmlns:p14="http://schemas.microsoft.com/office/powerpoint/2010/main" val="74689949"/>
+      </p:ext>
+    </p:extLst>
+  </p:cSld>
+  <p:clrMapOvr>
+    <a:masterClrMapping/>
+  </p:clrMapOvr>
+  <p:timing>
+    <p:tnLst>
+      <p:par>
+        <p:cTn id="1" dur="indefinite" restart="never" nodeType="tmRoot"/>
+      </p:par>
+    </p:tnLst>
+  </p:timing>
+</p:sld>
+</file>
+
+<file path=ppt/slides/slide15.xml><?xml version="1.0" encoding="utf-8"?>
+<p:sld xmlns:a="http://schemas.openxmlformats.org/drawingml/2006/main" xmlns:r="http://schemas.openxmlformats.org/officeDocument/2006/relationships" xmlns:p="http://schemas.openxmlformats.org/presentationml/2006/main">
+  <p:cSld>
+    <p:spTree>
+      <p:nvGrpSpPr>
+        <p:cNvPr id="1" name=""/>
+        <p:cNvGrpSpPr/>
+        <p:nvPr/>
+      </p:nvGrpSpPr>
+      <p:grpSpPr>
+        <a:xfrm>
+          <a:off x="0" y="0"/>
+          <a:ext cx="0" cy="0"/>
+          <a:chOff x="0" y="0"/>
+          <a:chExt cx="0" cy="0"/>
+        </a:xfrm>
+      </p:grpSpPr>
+      <p:pic>
+        <p:nvPicPr>
+          <p:cNvPr id="8" name="Marcador de contenido 7"/>
+          <p:cNvPicPr>
+            <a:picLocks noGrp="1" noChangeAspect="1"/>
+          </p:cNvPicPr>
+          <p:nvPr>
+            <p:ph idx="1"/>
+          </p:nvPr>
+        </p:nvPicPr>
+        <p:blipFill>
+          <a:blip r:embed="rId2"/>
+          <a:stretch>
+            <a:fillRect/>
+          </a:stretch>
+        </p:blipFill>
+        <p:spPr>
+          <a:xfrm>
+            <a:off x="2958622" y="1211885"/>
+            <a:ext cx="7125906" cy="3132377"/>
+          </a:xfrm>
+          <a:prstGeom prst="rect">
+            <a:avLst/>
+          </a:prstGeom>
+        </p:spPr>
+      </p:pic>
+      <p:pic>
+        <p:nvPicPr>
+          <p:cNvPr id="9" name="Imagen 8"/>
+          <p:cNvPicPr>
+            <a:picLocks noChangeAspect="1"/>
+          </p:cNvPicPr>
+          <p:nvPr/>
+        </p:nvPicPr>
+        <p:blipFill>
+          <a:blip r:embed="rId3"/>
+          <a:stretch>
+            <a:fillRect/>
+          </a:stretch>
+        </p:blipFill>
+        <p:spPr>
+          <a:xfrm>
+            <a:off x="2958622" y="4344262"/>
+            <a:ext cx="7125906" cy="1776430"/>
+          </a:xfrm>
+          <a:prstGeom prst="rect">
+            <a:avLst/>
+          </a:prstGeom>
+        </p:spPr>
+      </p:pic>
+      <p:sp>
+        <p:nvSpPr>
+          <p:cNvPr id="10" name="CuadroTexto 9"/>
+          <p:cNvSpPr txBox="1"/>
+          <p:nvPr/>
+        </p:nvSpPr>
+        <p:spPr>
+          <a:xfrm>
+            <a:off x="4953000" y="842553"/>
+            <a:ext cx="3604260" cy="369332"/>
+          </a:xfrm>
+          <a:prstGeom prst="rect">
+            <a:avLst/>
+          </a:prstGeom>
+          <a:noFill/>
+        </p:spPr>
+        <p:txBody>
+          <a:bodyPr wrap="square" rtlCol="0">
+            <a:spAutoFit/>
+          </a:bodyPr>
+          <a:lstStyle/>
+          <a:p>
+            <a:r>
+              <a:rPr lang="es-MX" dirty="0" smtClean="0"/>
+              <a:t>Seguimiento y control de Riesgos</a:t>
+            </a:r>
+            <a:endParaRPr lang="es-MX" dirty="0"/>
+          </a:p>
+        </p:txBody>
+      </p:sp>
+    </p:spTree>
+    <p:extLst>
+      <p:ext uri="{BB962C8B-B14F-4D97-AF65-F5344CB8AC3E}">
+        <p14:creationId xmlns:p14="http://schemas.microsoft.com/office/powerpoint/2010/main" val="1253462028"/>
+      </p:ext>
+    </p:extLst>
+  </p:cSld>
+  <p:clrMapOvr>
+    <a:masterClrMapping/>
+  </p:clrMapOvr>
+  <p:timing>
+    <p:tnLst>
+      <p:par>
+        <p:cTn id="1" dur="indefinite" restart="never" nodeType="tmRoot"/>
+      </p:par>
+    </p:tnLst>
+  </p:timing>
+</p:sld>
+</file>
+
+<file path=ppt/slides/slide16.xml><?xml version="1.0" encoding="utf-8"?>
+<p:sld xmlns:a="http://schemas.openxmlformats.org/drawingml/2006/main" xmlns:r="http://schemas.openxmlformats.org/officeDocument/2006/relationships" xmlns:p="http://schemas.openxmlformats.org/presentationml/2006/main">
+  <p:cSld>
+    <p:spTree>
+      <p:nvGrpSpPr>
+        <p:cNvPr id="1" name=""/>
+        <p:cNvGrpSpPr/>
+        <p:nvPr/>
+      </p:nvGrpSpPr>
+      <p:grpSpPr>
+        <a:xfrm>
+          <a:off x="0" y="0"/>
+          <a:ext cx="0" cy="0"/>
+          <a:chOff x="0" y="0"/>
+          <a:chExt cx="0" cy="0"/>
+        </a:xfrm>
+      </p:grpSpPr>
+      <p:sp>
+        <p:nvSpPr>
+          <p:cNvPr id="2" name="Título 1"/>
+          <p:cNvSpPr>
+            <a:spLocks noGrp="1"/>
+          </p:cNvSpPr>
+          <p:nvPr>
+            <p:ph type="title"/>
+          </p:nvPr>
+        </p:nvSpPr>
+        <p:spPr/>
+        <p:txBody>
+          <a:bodyPr>
+            <a:normAutofit/>
+          </a:bodyPr>
+          <a:lstStyle/>
+          <a:p>
+            <a:pPr algn="ctr"/>
+            <a:r>
+              <a:rPr lang="es-MX" sz="4000" dirty="0" smtClean="0"/>
+              <a:t>MÉTODOS DE COMUNICACIÓN</a:t>
+            </a:r>
+            <a:endParaRPr lang="es-MX" sz="4000" dirty="0"/>
+          </a:p>
+        </p:txBody>
+      </p:sp>
+      <p:pic>
+        <p:nvPicPr>
+          <p:cNvPr id="12" name="Marcador de contenido 11"/>
+          <p:cNvPicPr>
+            <a:picLocks noGrp="1" noChangeAspect="1"/>
+          </p:cNvPicPr>
+          <p:nvPr>
+            <p:ph idx="1"/>
+          </p:nvPr>
+        </p:nvPicPr>
+        <p:blipFill rotWithShape="1">
+          <a:blip r:embed="rId2"/>
+          <a:srcRect l="238" r="238" b="882"/>
+          <a:stretch/>
+        </p:blipFill>
+        <p:spPr>
+          <a:xfrm>
+            <a:off x="1958340" y="1579066"/>
+            <a:ext cx="4346046" cy="1559608"/>
+          </a:xfrm>
+          <a:prstGeom prst="rect">
+            <a:avLst/>
+          </a:prstGeom>
+        </p:spPr>
+      </p:pic>
+      <p:pic>
+        <p:nvPicPr>
+          <p:cNvPr id="13" name="Imagen 12"/>
+          <p:cNvPicPr>
+            <a:picLocks noChangeAspect="1"/>
+          </p:cNvPicPr>
+          <p:nvPr/>
+        </p:nvPicPr>
+        <p:blipFill>
+          <a:blip r:embed="rId3"/>
+          <a:stretch>
+            <a:fillRect/>
+          </a:stretch>
+        </p:blipFill>
+        <p:spPr>
+          <a:xfrm>
+            <a:off x="1958340" y="3138674"/>
+            <a:ext cx="4346046" cy="2597271"/>
+          </a:xfrm>
+          <a:prstGeom prst="rect">
+            <a:avLst/>
+          </a:prstGeom>
+        </p:spPr>
+      </p:pic>
+      <p:pic>
+        <p:nvPicPr>
+          <p:cNvPr id="15" name="Marcador de contenido 3"/>
+          <p:cNvPicPr>
+            <a:picLocks noChangeAspect="1"/>
+          </p:cNvPicPr>
+          <p:nvPr/>
+        </p:nvPicPr>
+        <p:blipFill>
+          <a:blip r:embed="rId4"/>
+          <a:stretch>
+            <a:fillRect/>
+          </a:stretch>
+        </p:blipFill>
+        <p:spPr>
+          <a:xfrm>
+            <a:off x="7038500" y="1615999"/>
+            <a:ext cx="4429601" cy="1522675"/>
+          </a:xfrm>
+          <a:prstGeom prst="rect">
+            <a:avLst/>
+          </a:prstGeom>
+          <a:ln>
+            <a:solidFill>
+              <a:schemeClr val="tx1"/>
+            </a:solidFill>
+          </a:ln>
+        </p:spPr>
+      </p:pic>
+      <p:pic>
+        <p:nvPicPr>
+          <p:cNvPr id="16" name="Imagen 15"/>
+          <p:cNvPicPr>
+            <a:picLocks noChangeAspect="1"/>
+          </p:cNvPicPr>
+          <p:nvPr/>
+        </p:nvPicPr>
+        <p:blipFill>
+          <a:blip r:embed="rId5"/>
+          <a:stretch>
+            <a:fillRect/>
+          </a:stretch>
+        </p:blipFill>
+        <p:spPr>
+          <a:xfrm>
+            <a:off x="7038499" y="3148227"/>
+            <a:ext cx="4429601" cy="1045370"/>
+          </a:xfrm>
+          <a:prstGeom prst="rect">
+            <a:avLst/>
+          </a:prstGeom>
+          <a:ln>
+            <a:solidFill>
+              <a:schemeClr val="tx1"/>
+            </a:solidFill>
+          </a:ln>
+        </p:spPr>
+      </p:pic>
+      <p:pic>
+        <p:nvPicPr>
+          <p:cNvPr id="17" name="Imagen 16"/>
+          <p:cNvPicPr>
+            <a:picLocks noChangeAspect="1"/>
+          </p:cNvPicPr>
+          <p:nvPr/>
+        </p:nvPicPr>
+        <p:blipFill rotWithShape="1">
+          <a:blip r:embed="rId6"/>
+          <a:srcRect l="211" t="1760" r="-1"/>
+          <a:stretch/>
+        </p:blipFill>
+        <p:spPr>
+          <a:xfrm>
+            <a:off x="7038499" y="4193597"/>
+            <a:ext cx="4440675" cy="1069890"/>
+          </a:xfrm>
+          <a:prstGeom prst="rect">
+            <a:avLst/>
+          </a:prstGeom>
+        </p:spPr>
+      </p:pic>
+    </p:spTree>
+    <p:extLst>
+      <p:ext uri="{BB962C8B-B14F-4D97-AF65-F5344CB8AC3E}">
+        <p14:creationId xmlns:p14="http://schemas.microsoft.com/office/powerpoint/2010/main" val="1798884094"/>
+      </p:ext>
+    </p:extLst>
+  </p:cSld>
+  <p:clrMapOvr>
+    <a:masterClrMapping/>
+  </p:clrMapOvr>
+  <p:timing>
+    <p:tnLst>
+      <p:par>
+        <p:cTn id="1" dur="indefinite" restart="never" nodeType="tmRoot"/>
+      </p:par>
+    </p:tnLst>
+  </p:timing>
+</p:sld>
+</file>
+
+<file path=ppt/slides/slide17.xml><?xml version="1.0" encoding="utf-8"?>
+<p:sld xmlns:a="http://schemas.openxmlformats.org/drawingml/2006/main" xmlns:r="http://schemas.openxmlformats.org/officeDocument/2006/relationships" xmlns:p="http://schemas.openxmlformats.org/presentationml/2006/main">
+  <p:cSld>
+    <p:spTree>
+      <p:nvGrpSpPr>
+        <p:cNvPr id="1" name=""/>
+        <p:cNvGrpSpPr/>
+        <p:nvPr/>
+      </p:nvGrpSpPr>
+      <p:grpSpPr>
+        <a:xfrm>
+          <a:off x="0" y="0"/>
+          <a:ext cx="0" cy="0"/>
+          <a:chOff x="0" y="0"/>
+          <a:chExt cx="0" cy="0"/>
+        </a:xfrm>
+      </p:grpSpPr>
+      <p:sp>
+        <p:nvSpPr>
+          <p:cNvPr id="2" name="Título 1"/>
+          <p:cNvSpPr>
+            <a:spLocks noGrp="1"/>
+          </p:cNvSpPr>
+          <p:nvPr>
+            <p:ph type="title"/>
+          </p:nvPr>
+        </p:nvSpPr>
+        <p:spPr>
+          <a:xfrm>
+            <a:off x="1295400" y="320040"/>
+            <a:ext cx="9601200" cy="1485900"/>
+          </a:xfrm>
+        </p:spPr>
+        <p:txBody>
+          <a:bodyPr/>
+          <a:lstStyle/>
+          <a:p>
+            <a:pPr algn="ctr"/>
+            <a:r>
+              <a:rPr lang="es-MX" dirty="0" smtClean="0"/>
+              <a:t>MODELO DE NEGOCIOS</a:t>
+            </a:r>
+            <a:endParaRPr lang="es-MX" dirty="0"/>
+          </a:p>
+        </p:txBody>
+      </p:sp>
+      <p:pic>
+        <p:nvPicPr>
+          <p:cNvPr id="4" name="Marcador de contenido 3" descr="C:\Users\FRANC\Downloads\APPMO-SP_MPN_v1.1.png"/>
+          <p:cNvPicPr>
+            <a:picLocks noGrp="1"/>
+          </p:cNvPicPr>
+          <p:nvPr>
+            <p:ph idx="1"/>
+          </p:nvPr>
+        </p:nvPicPr>
+        <p:blipFill rotWithShape="1">
+          <a:blip r:embed="rId2" cstate="print">
+            <a:extLst>
+              <a:ext uri="{28A0092B-C50C-407E-A947-70E740481C1C}">
+                <a14:useLocalDpi xmlns:a14="http://schemas.microsoft.com/office/drawing/2010/main" val="0"/>
+              </a:ext>
+            </a:extLst>
+          </a:blip>
+          <a:srcRect l="-204" r="52228" b="9320"/>
+          <a:stretch/>
+        </p:blipFill>
+        <p:spPr bwMode="auto">
+          <a:xfrm>
+            <a:off x="2133600" y="1805940"/>
+            <a:ext cx="8359140" cy="4091940"/>
+          </a:xfrm>
+          <a:prstGeom prst="rect">
+            <a:avLst/>
+          </a:prstGeom>
+          <a:noFill/>
+          <a:ln>
+            <a:noFill/>
+          </a:ln>
+          <a:extLst>
+            <a:ext uri="{53640926-AAD7-44D8-BBD7-CCE9431645EC}">
+              <a14:shadowObscured xmlns:a14="http://schemas.microsoft.com/office/drawing/2010/main"/>
+            </a:ext>
+          </a:extLst>
+        </p:spPr>
+      </p:pic>
+      <p:sp>
+        <p:nvSpPr>
+          <p:cNvPr id="6" name="CuadroTexto 5"/>
+          <p:cNvSpPr txBox="1"/>
+          <p:nvPr/>
+        </p:nvSpPr>
+        <p:spPr>
+          <a:xfrm>
+            <a:off x="5806440" y="5897880"/>
+            <a:ext cx="1584960" cy="276999"/>
+          </a:xfrm>
+          <a:prstGeom prst="rect">
+            <a:avLst/>
+          </a:prstGeom>
+          <a:noFill/>
+        </p:spPr>
+        <p:txBody>
+          <a:bodyPr wrap="square" rtlCol="0">
+            <a:spAutoFit/>
+          </a:bodyPr>
+          <a:lstStyle/>
+          <a:p>
+            <a:r>
+              <a:rPr lang="es-MX" sz="1200" dirty="0" smtClean="0"/>
+              <a:t>Parte 1 de 2</a:t>
+            </a:r>
+            <a:endParaRPr lang="es-MX" sz="1200" dirty="0"/>
+          </a:p>
+        </p:txBody>
+      </p:sp>
+    </p:spTree>
+    <p:extLst>
+      <p:ext uri="{BB962C8B-B14F-4D97-AF65-F5344CB8AC3E}">
+        <p14:creationId xmlns:p14="http://schemas.microsoft.com/office/powerpoint/2010/main" val="2689249979"/>
+      </p:ext>
+    </p:extLst>
+  </p:cSld>
+  <p:clrMapOvr>
+    <a:masterClrMapping/>
+  </p:clrMapOvr>
+</p:sld>
+</file>
+
+<file path=ppt/slides/slide18.xml><?xml version="1.0" encoding="utf-8"?>
+<p:sld xmlns:a="http://schemas.openxmlformats.org/drawingml/2006/main" xmlns:r="http://schemas.openxmlformats.org/officeDocument/2006/relationships" xmlns:p="http://schemas.openxmlformats.org/presentationml/2006/main">
+  <p:cSld>
+    <p:spTree>
+      <p:nvGrpSpPr>
+        <p:cNvPr id="1" name=""/>
+        <p:cNvGrpSpPr/>
+        <p:nvPr/>
+      </p:nvGrpSpPr>
+      <p:grpSpPr>
+        <a:xfrm>
+          <a:off x="0" y="0"/>
+          <a:ext cx="0" cy="0"/>
+          <a:chOff x="0" y="0"/>
+          <a:chExt cx="0" cy="0"/>
+        </a:xfrm>
+      </p:grpSpPr>
+      <p:pic>
+        <p:nvPicPr>
+          <p:cNvPr id="4" name="Marcador de contenido 3" descr="C:\Users\FRANC\Downloads\APPMO-SP_MPN_v1.1.png"/>
+          <p:cNvPicPr>
+            <a:picLocks noGrp="1"/>
+          </p:cNvPicPr>
+          <p:nvPr>
+            <p:ph idx="1"/>
+          </p:nvPr>
+        </p:nvPicPr>
+        <p:blipFill rotWithShape="1">
+          <a:blip r:embed="rId2" cstate="print">
+            <a:extLst>
+              <a:ext uri="{28A0092B-C50C-407E-A947-70E740481C1C}">
+                <a14:useLocalDpi xmlns:a14="http://schemas.microsoft.com/office/drawing/2010/main" val="0"/>
+              </a:ext>
+            </a:extLst>
+          </a:blip>
+          <a:srcRect l="47707" b="8859"/>
+          <a:stretch/>
+        </p:blipFill>
+        <p:spPr bwMode="auto">
+          <a:xfrm>
+            <a:off x="2072078" y="1714500"/>
+            <a:ext cx="8870242" cy="3604260"/>
+          </a:xfrm>
+          <a:prstGeom prst="rect">
+            <a:avLst/>
+          </a:prstGeom>
+          <a:noFill/>
+          <a:ln>
+            <a:noFill/>
+          </a:ln>
+          <a:extLst>
+            <a:ext uri="{53640926-AAD7-44D8-BBD7-CCE9431645EC}">
+              <a14:shadowObscured xmlns:a14="http://schemas.microsoft.com/office/drawing/2010/main"/>
+            </a:ext>
+          </a:extLst>
+        </p:spPr>
+      </p:pic>
+      <p:sp>
+        <p:nvSpPr>
+          <p:cNvPr id="5" name="CuadroTexto 4"/>
+          <p:cNvSpPr txBox="1"/>
+          <p:nvPr/>
+        </p:nvSpPr>
+        <p:spPr>
+          <a:xfrm>
+            <a:off x="5631180" y="5425440"/>
+            <a:ext cx="1584960" cy="276999"/>
+          </a:xfrm>
+          <a:prstGeom prst="rect">
+            <a:avLst/>
+          </a:prstGeom>
+          <a:noFill/>
+        </p:spPr>
+        <p:txBody>
+          <a:bodyPr wrap="square" rtlCol="0">
+            <a:spAutoFit/>
+          </a:bodyPr>
+          <a:lstStyle/>
+          <a:p>
+            <a:r>
+              <a:rPr lang="es-MX" sz="1200" dirty="0" smtClean="0"/>
+              <a:t>Parte 2 de 2</a:t>
+            </a:r>
+            <a:endParaRPr lang="es-MX" sz="1200" dirty="0"/>
+          </a:p>
+        </p:txBody>
+      </p:sp>
+    </p:spTree>
+    <p:extLst>
+      <p:ext uri="{BB962C8B-B14F-4D97-AF65-F5344CB8AC3E}">
+        <p14:creationId xmlns:p14="http://schemas.microsoft.com/office/powerpoint/2010/main" val="2751197313"/>
+      </p:ext>
+    </p:extLst>
+  </p:cSld>
+  <p:clrMapOvr>
+    <a:masterClrMapping/>
+  </p:clrMapOvr>
+</p:sld>
+</file>
+
+<file path=ppt/slides/slide19.xml><?xml version="1.0" encoding="utf-8"?>
+<p:sld xmlns:a="http://schemas.openxmlformats.org/drawingml/2006/main" xmlns:r="http://schemas.openxmlformats.org/officeDocument/2006/relationships" xmlns:p="http://schemas.openxmlformats.org/presentationml/2006/main">
+  <p:cSld>
+    <p:spTree>
+      <p:nvGrpSpPr>
+        <p:cNvPr id="1" name=""/>
+        <p:cNvGrpSpPr/>
+        <p:nvPr/>
+      </p:nvGrpSpPr>
+      <p:grpSpPr>
+        <a:xfrm>
+          <a:off x="0" y="0"/>
+          <a:ext cx="0" cy="0"/>
+          <a:chOff x="0" y="0"/>
+          <a:chExt cx="0" cy="0"/>
+        </a:xfrm>
+      </p:grpSpPr>
+      <p:sp>
+        <p:nvSpPr>
+          <p:cNvPr id="2" name="Título 1"/>
+          <p:cNvSpPr>
+            <a:spLocks noGrp="1"/>
+          </p:cNvSpPr>
+          <p:nvPr>
+            <p:ph type="title"/>
+          </p:nvPr>
+        </p:nvSpPr>
+        <p:spPr>
+          <a:xfrm>
+            <a:off x="1371600" y="381000"/>
+            <a:ext cx="9601200" cy="1485900"/>
+          </a:xfrm>
+        </p:spPr>
+        <p:txBody>
+          <a:bodyPr>
+            <a:normAutofit/>
+          </a:bodyPr>
+          <a:lstStyle/>
+          <a:p>
+            <a:pPr algn="ctr"/>
+            <a:r>
+              <a:rPr lang="es-MX" sz="4000" dirty="0" smtClean="0"/>
+              <a:t>ESTANDARES APLICADOS EN EL PROYECTO.</a:t>
+            </a:r>
+            <a:endParaRPr lang="es-MX" sz="4000" dirty="0"/>
+          </a:p>
+        </p:txBody>
+      </p:sp>
+      <p:pic>
+        <p:nvPicPr>
+          <p:cNvPr id="5" name="Imagen 4"/>
+          <p:cNvPicPr>
+            <a:picLocks noChangeAspect="1"/>
+          </p:cNvPicPr>
+          <p:nvPr/>
+        </p:nvPicPr>
+        <p:blipFill>
+          <a:blip r:embed="rId2"/>
+          <a:stretch>
+            <a:fillRect/>
+          </a:stretch>
+        </p:blipFill>
+        <p:spPr>
+          <a:xfrm>
+            <a:off x="2771330" y="4047226"/>
+            <a:ext cx="7180390" cy="2645681"/>
+          </a:xfrm>
+          <a:prstGeom prst="rect">
+            <a:avLst/>
+          </a:prstGeom>
+        </p:spPr>
+      </p:pic>
+      <p:sp>
+        <p:nvSpPr>
+          <p:cNvPr id="6" name="CuadroTexto 5"/>
+          <p:cNvSpPr txBox="1"/>
+          <p:nvPr/>
+        </p:nvSpPr>
+        <p:spPr>
+          <a:xfrm>
+            <a:off x="2362200" y="2209080"/>
+            <a:ext cx="7802880" cy="1754326"/>
+          </a:xfrm>
+          <a:prstGeom prst="rect">
+            <a:avLst/>
+          </a:prstGeom>
+          <a:noFill/>
+        </p:spPr>
+        <p:txBody>
+          <a:bodyPr wrap="square" rtlCol="0">
+            <a:spAutoFit/>
+          </a:bodyPr>
+          <a:lstStyle/>
+          <a:p>
+            <a:pPr algn="ctr"/>
+            <a:r>
+              <a:rPr lang="es-MX" dirty="0"/>
+              <a:t>ISO/IEC 25000, conocida como Suaré (System and Software </a:t>
+            </a:r>
+            <a:r>
+              <a:rPr lang="es-MX" dirty="0" err="1" smtClean="0"/>
+              <a:t>Quality</a:t>
+            </a:r>
+            <a:endParaRPr lang="es-MX" dirty="0" smtClean="0"/>
+          </a:p>
+          <a:p>
+            <a:pPr algn="ctr"/>
+            <a:r>
+              <a:rPr lang="es-MX" dirty="0" smtClean="0"/>
+              <a:t> </a:t>
+            </a:r>
+            <a:r>
+              <a:rPr lang="es-MX" dirty="0" err="1"/>
+              <a:t>Requirements</a:t>
+            </a:r>
+            <a:r>
+              <a:rPr lang="es-MX" dirty="0"/>
+              <a:t> and Evaluación), es una familia de normas que tiene por </a:t>
+            </a:r>
+            <a:endParaRPr lang="es-MX" dirty="0" smtClean="0"/>
+          </a:p>
+          <a:p>
+            <a:pPr algn="ctr"/>
+            <a:r>
+              <a:rPr lang="es-MX" dirty="0" smtClean="0"/>
+              <a:t>objetivo </a:t>
+            </a:r>
+            <a:r>
+              <a:rPr lang="es-MX" dirty="0"/>
+              <a:t>la creación de un marco de trabajo común para evaluar la calidad </a:t>
+            </a:r>
+            <a:r>
+              <a:rPr lang="es-MX" dirty="0" smtClean="0"/>
+              <a:t>del</a:t>
+            </a:r>
+          </a:p>
+          <a:p>
+            <a:pPr algn="ctr"/>
+            <a:r>
+              <a:rPr lang="es-MX" dirty="0" smtClean="0"/>
+              <a:t> </a:t>
+            </a:r>
+            <a:r>
+              <a:rPr lang="es-MX" dirty="0"/>
+              <a:t>producto software</a:t>
+            </a:r>
+            <a:r>
+              <a:rPr lang="es-MX" dirty="0" smtClean="0"/>
+              <a:t>. </a:t>
+            </a:r>
+            <a:r>
+              <a:rPr lang="es-MX" dirty="0"/>
+              <a:t>, </a:t>
+            </a:r>
+            <a:r>
+              <a:rPr lang="es-MX" dirty="0" smtClean="0"/>
+              <a:t>describe </a:t>
+            </a:r>
+            <a:r>
+              <a:rPr lang="es-MX" dirty="0"/>
+              <a:t>las particularidades de un modelo de calidad </a:t>
+            </a:r>
+            <a:r>
+              <a:rPr lang="es-MX" dirty="0" smtClean="0"/>
+              <a:t>del</a:t>
+            </a:r>
+          </a:p>
+          <a:p>
+            <a:pPr algn="ctr"/>
+            <a:r>
+              <a:rPr lang="es-MX" dirty="0" smtClean="0"/>
+              <a:t> </a:t>
+            </a:r>
+            <a:r>
+              <a:rPr lang="es-MX" dirty="0"/>
+              <a:t>producto </a:t>
+            </a:r>
+            <a:r>
+              <a:rPr lang="es-MX" dirty="0" err="1" smtClean="0"/>
+              <a:t>software,que</a:t>
+            </a:r>
+            <a:r>
+              <a:rPr lang="es-MX" dirty="0" smtClean="0"/>
+              <a:t> </a:t>
+            </a:r>
+            <a:r>
+              <a:rPr lang="es-MX" dirty="0"/>
+              <a:t>abordaba el proceso de evaluación de productos </a:t>
+            </a:r>
+            <a:endParaRPr lang="es-MX" dirty="0" smtClean="0"/>
+          </a:p>
+          <a:p>
+            <a:pPr algn="ctr"/>
+            <a:r>
+              <a:rPr lang="es-MX" dirty="0" smtClean="0"/>
+              <a:t>software </a:t>
+            </a:r>
+            <a:endParaRPr lang="es-MX" dirty="0"/>
+          </a:p>
+        </p:txBody>
+      </p:sp>
+      <p:sp>
+        <p:nvSpPr>
+          <p:cNvPr id="8" name="CuadroTexto 7"/>
+          <p:cNvSpPr txBox="1"/>
+          <p:nvPr/>
+        </p:nvSpPr>
+        <p:spPr>
+          <a:xfrm>
+            <a:off x="4892040" y="1540903"/>
+            <a:ext cx="3322320" cy="461665"/>
+          </a:xfrm>
+          <a:prstGeom prst="rect">
+            <a:avLst/>
+          </a:prstGeom>
+          <a:noFill/>
+        </p:spPr>
+        <p:txBody>
+          <a:bodyPr wrap="square" rtlCol="0">
+            <a:spAutoFit/>
+          </a:bodyPr>
+          <a:lstStyle/>
+          <a:p>
+            <a:pPr algn="ctr"/>
+            <a:r>
+              <a:rPr lang="es-MX" sz="2400" b="1" dirty="0" smtClean="0"/>
+              <a:t>ISO 25000</a:t>
+            </a:r>
+            <a:endParaRPr lang="es-MX" sz="2400" b="1" dirty="0"/>
+          </a:p>
+        </p:txBody>
+      </p:sp>
+    </p:spTree>
+    <p:extLst>
+      <p:ext uri="{BB962C8B-B14F-4D97-AF65-F5344CB8AC3E}">
+        <p14:creationId xmlns:p14="http://schemas.microsoft.com/office/powerpoint/2010/main" val="3088391084"/>
+      </p:ext>
+    </p:extLst>
+  </p:cSld>
+  <p:clrMapOvr>
+    <a:masterClrMapping/>
+  </p:clrMapOvr>
+</p:sld>
+</file>
+
 <file path=ppt/slides/slide2.xml><?xml version="1.0" encoding="utf-8"?>
 <p:sld xmlns:a="http://schemas.openxmlformats.org/drawingml/2006/main" xmlns:r="http://schemas.openxmlformats.org/officeDocument/2006/relationships" xmlns:p="http://schemas.openxmlformats.org/presentationml/2006/main">
   <p:cSld>
@@ -4471,6 +5917,376 @@
     <p:extLst>
       <p:ext uri="{BB962C8B-B14F-4D97-AF65-F5344CB8AC3E}">
         <p14:creationId xmlns:p14="http://schemas.microsoft.com/office/powerpoint/2010/main" val="3595940211"/>
+      </p:ext>
+    </p:extLst>
+  </p:cSld>
+  <p:clrMapOvr>
+    <a:masterClrMapping/>
+  </p:clrMapOvr>
+</p:sld>
+</file>
+
+<file path=ppt/slides/slide20.xml><?xml version="1.0" encoding="utf-8"?>
+<p:sld xmlns:a="http://schemas.openxmlformats.org/drawingml/2006/main" xmlns:r="http://schemas.openxmlformats.org/officeDocument/2006/relationships" xmlns:p="http://schemas.openxmlformats.org/presentationml/2006/main">
+  <p:cSld>
+    <p:spTree>
+      <p:nvGrpSpPr>
+        <p:cNvPr id="1" name=""/>
+        <p:cNvGrpSpPr/>
+        <p:nvPr/>
+      </p:nvGrpSpPr>
+      <p:grpSpPr>
+        <a:xfrm>
+          <a:off x="0" y="0"/>
+          <a:ext cx="0" cy="0"/>
+          <a:chOff x="0" y="0"/>
+          <a:chExt cx="0" cy="0"/>
+        </a:xfrm>
+      </p:grpSpPr>
+      <p:sp>
+        <p:nvSpPr>
+          <p:cNvPr id="5" name="Marcador de contenido 4"/>
+          <p:cNvSpPr>
+            <a:spLocks noGrp="1"/>
+          </p:cNvSpPr>
+          <p:nvPr>
+            <p:ph idx="1"/>
+          </p:nvPr>
+        </p:nvSpPr>
+        <p:spPr>
+          <a:xfrm>
+            <a:off x="1341120" y="1052719"/>
+            <a:ext cx="9707880" cy="2300081"/>
+          </a:xfrm>
+        </p:spPr>
+        <p:txBody>
+          <a:bodyPr/>
+          <a:lstStyle/>
+          <a:p>
+            <a:pPr marL="0" indent="0" algn="ctr">
+              <a:buNone/>
+            </a:pPr>
+            <a:r>
+              <a:rPr lang="es-MX" dirty="0" smtClean="0"/>
+              <a:t>El </a:t>
+            </a:r>
+            <a:r>
+              <a:rPr lang="es-MX" dirty="0"/>
+              <a:t>estándar IEEE 830-1998 para el SRS o ERS (Especificación de requerimientos de </a:t>
+            </a:r>
+            <a:endParaRPr lang="es-MX" dirty="0" smtClean="0"/>
+          </a:p>
+          <a:p>
+            <a:pPr marL="0" indent="0" algn="ctr">
+              <a:buNone/>
+            </a:pPr>
+            <a:r>
+              <a:rPr lang="es-MX" dirty="0" smtClean="0"/>
+              <a:t>software</a:t>
+            </a:r>
+            <a:r>
+              <a:rPr lang="es-MX" dirty="0"/>
+              <a:t>) es un conjunto de recomendaciones para la especificación de los </a:t>
+            </a:r>
+            <a:endParaRPr lang="es-MX" dirty="0" smtClean="0"/>
+          </a:p>
+          <a:p>
+            <a:pPr marL="0" indent="0" algn="ctr">
+              <a:buNone/>
+            </a:pPr>
+            <a:r>
+              <a:rPr lang="es-MX" dirty="0" smtClean="0"/>
+              <a:t>requerimiento </a:t>
+            </a:r>
+            <a:r>
+              <a:rPr lang="es-MX" dirty="0"/>
+              <a:t>o requisitos de software el cual tiene como producto final la </a:t>
+            </a:r>
+            <a:endParaRPr lang="es-MX" dirty="0" smtClean="0"/>
+          </a:p>
+          <a:p>
+            <a:pPr marL="0" indent="0" algn="ctr">
+              <a:buNone/>
+            </a:pPr>
+            <a:r>
+              <a:rPr lang="es-MX" dirty="0" smtClean="0"/>
+              <a:t>documentación </a:t>
+            </a:r>
+            <a:r>
+              <a:rPr lang="es-MX" dirty="0"/>
+              <a:t>de los acuerdos entre el cliente y el grupo de desarrollo para </a:t>
+            </a:r>
+            <a:r>
+              <a:rPr lang="es-MX" dirty="0" smtClean="0"/>
+              <a:t>así</a:t>
+            </a:r>
+          </a:p>
+          <a:p>
+            <a:pPr marL="0" indent="0" algn="ctr">
+              <a:buNone/>
+            </a:pPr>
+            <a:r>
+              <a:rPr lang="es-MX" dirty="0" smtClean="0"/>
+              <a:t> </a:t>
+            </a:r>
+            <a:r>
+              <a:rPr lang="es-MX" dirty="0"/>
+              <a:t>cumplir con la totalidad de exigencias </a:t>
+            </a:r>
+            <a:r>
+              <a:rPr lang="es-MX" dirty="0" smtClean="0"/>
+              <a:t>estipuladas.</a:t>
+            </a:r>
+          </a:p>
+          <a:p>
+            <a:pPr marL="0" indent="0" algn="ctr">
+              <a:buNone/>
+            </a:pPr>
+            <a:endParaRPr lang="es-MX" dirty="0"/>
+          </a:p>
+        </p:txBody>
+      </p:sp>
+      <p:sp>
+        <p:nvSpPr>
+          <p:cNvPr id="6" name="CuadroTexto 5"/>
+          <p:cNvSpPr txBox="1"/>
+          <p:nvPr/>
+        </p:nvSpPr>
+        <p:spPr>
+          <a:xfrm>
+            <a:off x="4686300" y="451243"/>
+            <a:ext cx="3322320" cy="461665"/>
+          </a:xfrm>
+          <a:prstGeom prst="rect">
+            <a:avLst/>
+          </a:prstGeom>
+          <a:noFill/>
+        </p:spPr>
+        <p:txBody>
+          <a:bodyPr wrap="square" rtlCol="0">
+            <a:spAutoFit/>
+          </a:bodyPr>
+          <a:lstStyle/>
+          <a:p>
+            <a:pPr algn="ctr"/>
+            <a:r>
+              <a:rPr lang="es-MX" sz="2400" b="1" dirty="0" smtClean="0"/>
+              <a:t>IEEE 830</a:t>
+            </a:r>
+            <a:endParaRPr lang="es-MX" sz="2400" b="1" dirty="0"/>
+          </a:p>
+        </p:txBody>
+      </p:sp>
+      <p:pic>
+        <p:nvPicPr>
+          <p:cNvPr id="7" name="Imagen 6"/>
+          <p:cNvPicPr>
+            <a:picLocks noChangeAspect="1"/>
+          </p:cNvPicPr>
+          <p:nvPr/>
+        </p:nvPicPr>
+        <p:blipFill>
+          <a:blip r:embed="rId2"/>
+          <a:stretch>
+            <a:fillRect/>
+          </a:stretch>
+        </p:blipFill>
+        <p:spPr>
+          <a:xfrm>
+            <a:off x="6423660" y="3492611"/>
+            <a:ext cx="3535614" cy="2989634"/>
+          </a:xfrm>
+          <a:prstGeom prst="rect">
+            <a:avLst/>
+          </a:prstGeom>
+        </p:spPr>
+      </p:pic>
+      <p:pic>
+        <p:nvPicPr>
+          <p:cNvPr id="8" name="Imagen 7"/>
+          <p:cNvPicPr>
+            <a:picLocks noChangeAspect="1"/>
+          </p:cNvPicPr>
+          <p:nvPr/>
+        </p:nvPicPr>
+        <p:blipFill>
+          <a:blip r:embed="rId3"/>
+          <a:stretch>
+            <a:fillRect/>
+          </a:stretch>
+        </p:blipFill>
+        <p:spPr>
+          <a:xfrm>
+            <a:off x="2684145" y="3492611"/>
+            <a:ext cx="3465195" cy="656835"/>
+          </a:xfrm>
+          <a:prstGeom prst="rect">
+            <a:avLst/>
+          </a:prstGeom>
+          <a:ln>
+            <a:solidFill>
+              <a:schemeClr val="tx1"/>
+            </a:solidFill>
+          </a:ln>
+        </p:spPr>
+      </p:pic>
+    </p:spTree>
+    <p:extLst>
+      <p:ext uri="{BB962C8B-B14F-4D97-AF65-F5344CB8AC3E}">
+        <p14:creationId xmlns:p14="http://schemas.microsoft.com/office/powerpoint/2010/main" val="576983190"/>
+      </p:ext>
+    </p:extLst>
+  </p:cSld>
+  <p:clrMapOvr>
+    <a:masterClrMapping/>
+  </p:clrMapOvr>
+</p:sld>
+</file>
+
+<file path=ppt/slides/slide21.xml><?xml version="1.0" encoding="utf-8"?>
+<p:sld xmlns:a="http://schemas.openxmlformats.org/drawingml/2006/main" xmlns:r="http://schemas.openxmlformats.org/officeDocument/2006/relationships" xmlns:p="http://schemas.openxmlformats.org/presentationml/2006/main">
+  <p:cSld>
+    <p:spTree>
+      <p:nvGrpSpPr>
+        <p:cNvPr id="1" name=""/>
+        <p:cNvGrpSpPr/>
+        <p:nvPr/>
+      </p:nvGrpSpPr>
+      <p:grpSpPr>
+        <a:xfrm>
+          <a:off x="0" y="0"/>
+          <a:ext cx="0" cy="0"/>
+          <a:chOff x="0" y="0"/>
+          <a:chExt cx="0" cy="0"/>
+        </a:xfrm>
+      </p:grpSpPr>
+      <p:sp>
+        <p:nvSpPr>
+          <p:cNvPr id="2" name="Título 1"/>
+          <p:cNvSpPr>
+            <a:spLocks noGrp="1"/>
+          </p:cNvSpPr>
+          <p:nvPr>
+            <p:ph type="title"/>
+          </p:nvPr>
+        </p:nvSpPr>
+        <p:spPr/>
+        <p:txBody>
+          <a:bodyPr/>
+          <a:lstStyle/>
+          <a:p>
+            <a:pPr algn="ctr"/>
+            <a:r>
+              <a:rPr lang="es-MX" dirty="0" smtClean="0"/>
+              <a:t>DEMOSTRACIÓN DEL SOFTWARE</a:t>
+            </a:r>
+            <a:endParaRPr lang="es-MX" dirty="0"/>
+          </a:p>
+        </p:txBody>
+      </p:sp>
+      <p:pic>
+        <p:nvPicPr>
+          <p:cNvPr id="4" name="Marcador de contenido 3"/>
+          <p:cNvPicPr>
+            <a:picLocks noGrp="1" noChangeAspect="1"/>
+          </p:cNvPicPr>
+          <p:nvPr>
+            <p:ph idx="1"/>
+          </p:nvPr>
+        </p:nvPicPr>
+        <p:blipFill>
+          <a:blip r:embed="rId2"/>
+          <a:stretch>
+            <a:fillRect/>
+          </a:stretch>
+        </p:blipFill>
+        <p:spPr>
+          <a:xfrm>
+            <a:off x="3431870" y="1996440"/>
+            <a:ext cx="5267300" cy="3581400"/>
+          </a:xfrm>
+          <a:prstGeom prst="rect">
+            <a:avLst/>
+          </a:prstGeom>
+        </p:spPr>
+      </p:pic>
+    </p:spTree>
+    <p:extLst>
+      <p:ext uri="{BB962C8B-B14F-4D97-AF65-F5344CB8AC3E}">
+        <p14:creationId xmlns:p14="http://schemas.microsoft.com/office/powerpoint/2010/main" val="1184427947"/>
+      </p:ext>
+    </p:extLst>
+  </p:cSld>
+  <p:clrMapOvr>
+    <a:masterClrMapping/>
+  </p:clrMapOvr>
+</p:sld>
+</file>
+
+<file path=ppt/slides/slide22.xml><?xml version="1.0" encoding="utf-8"?>
+<p:sld xmlns:a="http://schemas.openxmlformats.org/drawingml/2006/main" xmlns:r="http://schemas.openxmlformats.org/officeDocument/2006/relationships" xmlns:p="http://schemas.openxmlformats.org/presentationml/2006/main">
+  <p:cSld>
+    <p:spTree>
+      <p:nvGrpSpPr>
+        <p:cNvPr id="1" name=""/>
+        <p:cNvGrpSpPr/>
+        <p:nvPr/>
+      </p:nvGrpSpPr>
+      <p:grpSpPr>
+        <a:xfrm>
+          <a:off x="0" y="0"/>
+          <a:ext cx="0" cy="0"/>
+          <a:chOff x="0" y="0"/>
+          <a:chExt cx="0" cy="0"/>
+        </a:xfrm>
+      </p:grpSpPr>
+      <p:sp>
+        <p:nvSpPr>
+          <p:cNvPr id="2" name="Título 1"/>
+          <p:cNvSpPr>
+            <a:spLocks noGrp="1"/>
+          </p:cNvSpPr>
+          <p:nvPr>
+            <p:ph type="title"/>
+          </p:nvPr>
+        </p:nvSpPr>
+        <p:spPr/>
+        <p:txBody>
+          <a:bodyPr/>
+          <a:lstStyle/>
+          <a:p>
+            <a:pPr algn="ctr"/>
+            <a:r>
+              <a:rPr lang="es-MX" dirty="0" smtClean="0"/>
+              <a:t>CIERRE DEL PROYECTO</a:t>
+            </a:r>
+            <a:endParaRPr lang="es-MX" dirty="0"/>
+          </a:p>
+        </p:txBody>
+      </p:sp>
+      <p:sp>
+        <p:nvSpPr>
+          <p:cNvPr id="3" name="Marcador de contenido 2"/>
+          <p:cNvSpPr>
+            <a:spLocks noGrp="1"/>
+          </p:cNvSpPr>
+          <p:nvPr>
+            <p:ph idx="1"/>
+          </p:nvPr>
+        </p:nvSpPr>
+        <p:spPr/>
+        <p:txBody>
+          <a:bodyPr/>
+          <a:lstStyle/>
+          <a:p>
+            <a:endParaRPr lang="es-MX" dirty="0"/>
+          </a:p>
+        </p:txBody>
+      </p:sp>
+    </p:spTree>
+    <p:extLst>
+      <p:ext uri="{BB962C8B-B14F-4D97-AF65-F5344CB8AC3E}">
+        <p14:creationId xmlns:p14="http://schemas.microsoft.com/office/powerpoint/2010/main" val="2236254483"/>
       </p:ext>
     </p:extLst>
   </p:cSld>
@@ -4540,7 +6356,7 @@
         </p:nvSpPr>
         <p:spPr>
           <a:xfrm>
-            <a:off x="4379189" y="1548498"/>
+            <a:off x="4105564" y="1228280"/>
             <a:ext cx="4010891" cy="858924"/>
           </a:xfrm>
         </p:spPr>
@@ -4629,6 +6445,44 @@
               <a:t>FODA</a:t>
             </a:r>
             <a:endParaRPr lang="es-MX" b="1" dirty="0"/>
+          </a:p>
+        </p:txBody>
+      </p:sp>
+      <p:sp>
+        <p:nvSpPr>
+          <p:cNvPr id="6" name="CuadroTexto 5"/>
+          <p:cNvSpPr txBox="1"/>
+          <p:nvPr/>
+        </p:nvSpPr>
+        <p:spPr>
+          <a:xfrm>
+            <a:off x="1163782" y="1440873"/>
+            <a:ext cx="2032000" cy="646331"/>
+          </a:xfrm>
+          <a:prstGeom prst="rect">
+            <a:avLst/>
+          </a:prstGeom>
+          <a:noFill/>
+        </p:spPr>
+        <p:txBody>
+          <a:bodyPr wrap="square" rtlCol="0">
+            <a:spAutoFit/>
+          </a:bodyPr>
+          <a:lstStyle/>
+          <a:p>
+            <a:r>
+              <a:rPr lang="es-MX" dirty="0" smtClean="0">
+                <a:solidFill>
+                  <a:srgbClr val="FF0000"/>
+                </a:solidFill>
+              </a:rPr>
+              <a:t>Agregar logo de la panadería</a:t>
+            </a:r>
+            <a:endParaRPr lang="es-MX" dirty="0">
+              <a:solidFill>
+                <a:srgbClr val="FF0000"/>
+              </a:solidFill>
+            </a:endParaRPr>
           </a:p>
         </p:txBody>
       </p:sp>
@@ -4916,12 +6770,20 @@
               <a:buNone/>
             </a:pPr>
             <a:r>
-              <a:rPr lang="es-MX" dirty="0" smtClean="0"/>
-              <a:t>la aplicación móvil “APPMO-SP” ayudará </a:t>
-            </a:r>
-            <a:r>
-              <a:rPr lang="es-MX" smtClean="0"/>
-              <a:t>a control </a:t>
+              <a:rPr lang="es-MX" dirty="0"/>
+              <a:t>L</a:t>
+            </a:r>
+            <a:r>
+              <a:rPr lang="es-MX" dirty="0" smtClean="0"/>
+              <a:t>a </a:t>
+            </a:r>
+            <a:r>
+              <a:rPr lang="es-MX" dirty="0" smtClean="0"/>
+              <a:t>aplicación móvil “APPMO-SP” ayudará a </a:t>
+            </a:r>
+            <a:r>
+              <a:rPr lang="es-MX" dirty="0" smtClean="0"/>
+              <a:t>controlar y administrar esta parte.</a:t>
             </a:r>
             <a:endParaRPr lang="es-MX" dirty="0" smtClean="0"/>
           </a:p>
@@ -4984,7 +6846,12 @@
           <a:bodyPr/>
           <a:lstStyle/>
           <a:p>
-            <a:endParaRPr lang="es-MX"/>
+            <a:pPr algn="ctr"/>
+            <a:r>
+              <a:rPr lang="es-MX" sz="4000" dirty="0" smtClean="0"/>
+              <a:t>JUSTIFICACIÓN</a:t>
+            </a:r>
+            <a:endParaRPr lang="es-MX" dirty="0"/>
           </a:p>
         </p:txBody>
       </p:sp>
@@ -4998,12 +6865,116 @@
             <p:ph idx="1"/>
           </p:nvPr>
         </p:nvSpPr>
-        <p:spPr/>
+        <p:spPr>
+          <a:xfrm>
+            <a:off x="1371600" y="1842654"/>
+            <a:ext cx="10053783" cy="3581400"/>
+          </a:xfrm>
+        </p:spPr>
         <p:txBody>
           <a:bodyPr/>
           <a:lstStyle/>
           <a:p>
-            <a:endParaRPr lang="es-MX"/>
+            <a:pPr marL="0" indent="0" algn="ctr">
+              <a:buNone/>
+            </a:pPr>
+            <a:r>
+              <a:rPr lang="es-MX" dirty="0" smtClean="0"/>
+              <a:t>La empresa panadería </a:t>
+            </a:r>
+            <a:r>
+              <a:rPr lang="es-MX" b="1" dirty="0" smtClean="0"/>
+              <a:t>San Pedro</a:t>
+            </a:r>
+            <a:r>
+              <a:rPr lang="es-MX" dirty="0" smtClean="0"/>
+              <a:t> carece de un control inteligente para</a:t>
+            </a:r>
+          </a:p>
+          <a:p>
+            <a:pPr marL="0" indent="0" algn="ctr">
+              <a:buNone/>
+            </a:pPr>
+            <a:r>
+              <a:rPr lang="es-MX" dirty="0" smtClean="0"/>
+              <a:t>administrar sus departamentos, </a:t>
+            </a:r>
+            <a:r>
+              <a:rPr lang="es-MX" dirty="0"/>
+              <a:t>inventarios, </a:t>
+            </a:r>
+            <a:r>
+              <a:rPr lang="es-MX" dirty="0" smtClean="0"/>
+              <a:t>ventas, compras</a:t>
+            </a:r>
+            <a:r>
+              <a:rPr lang="es-MX" dirty="0"/>
+              <a:t>, suministros, registros </a:t>
+            </a:r>
+            <a:r>
+              <a:rPr lang="es-MX" dirty="0" smtClean="0"/>
+              <a:t>de</a:t>
+            </a:r>
+          </a:p>
+          <a:p>
+            <a:pPr marL="0" indent="0" algn="ctr">
+              <a:buNone/>
+            </a:pPr>
+            <a:r>
+              <a:rPr lang="es-MX" dirty="0" smtClean="0"/>
+              <a:t>entradas</a:t>
+            </a:r>
+            <a:r>
+              <a:rPr lang="es-MX" dirty="0"/>
+              <a:t>, salidas y </a:t>
+            </a:r>
+            <a:r>
+              <a:rPr lang="es-MX" dirty="0" smtClean="0"/>
+              <a:t>rutas. Por lo que es muy común que existan perdidas  de información.</a:t>
+            </a:r>
+            <a:endParaRPr lang="es-MX" dirty="0"/>
+          </a:p>
+          <a:p>
+            <a:pPr marL="0" indent="0" algn="ctr">
+              <a:buNone/>
+            </a:pPr>
+            <a:r>
+              <a:rPr lang="es-MX" dirty="0" smtClean="0"/>
+              <a:t>El desarrollo de una aplicación móvil que permita conocer los estados de cada</a:t>
+            </a:r>
+          </a:p>
+          <a:p>
+            <a:pPr marL="0" indent="0" algn="ctr">
+              <a:buNone/>
+            </a:pPr>
+            <a:r>
+              <a:rPr lang="es-MX" dirty="0" smtClean="0"/>
+              <a:t>modulo y departamento de la empresa, será una forma para mejorar la parte </a:t>
+            </a:r>
+          </a:p>
+          <a:p>
+            <a:pPr marL="0" indent="0" algn="ctr">
+              <a:buNone/>
+            </a:pPr>
+            <a:r>
+              <a:rPr lang="es-MX" dirty="0" smtClean="0"/>
+              <a:t>administrativa de la empresa. El fin de la aplicación consistirá en que, tanto los empleados</a:t>
+            </a:r>
+          </a:p>
+          <a:p>
+            <a:pPr marL="0" indent="0" algn="ctr">
+              <a:buNone/>
+            </a:pPr>
+            <a:r>
+              <a:rPr lang="es-MX" dirty="0" smtClean="0"/>
+              <a:t>como el administrador puedan tener a la mano la información sin que existan perdidas.</a:t>
+            </a:r>
+          </a:p>
+          <a:p>
+            <a:pPr marL="0" indent="0" algn="ctr">
+              <a:buNone/>
+            </a:pPr>
+            <a:endParaRPr lang="es-MX" dirty="0" smtClean="0"/>
           </a:p>
         </p:txBody>
       </p:sp>
@@ -5011,6 +6982,746 @@
     <p:extLst>
       <p:ext uri="{BB962C8B-B14F-4D97-AF65-F5344CB8AC3E}">
         <p14:creationId xmlns:p14="http://schemas.microsoft.com/office/powerpoint/2010/main" val="1350898886"/>
+      </p:ext>
+    </p:extLst>
+  </p:cSld>
+  <p:clrMapOvr>
+    <a:masterClrMapping/>
+  </p:clrMapOvr>
+</p:sld>
+</file>
+
+<file path=ppt/slides/slide7.xml><?xml version="1.0" encoding="utf-8"?>
+<p:sld xmlns:a="http://schemas.openxmlformats.org/drawingml/2006/main" xmlns:r="http://schemas.openxmlformats.org/officeDocument/2006/relationships" xmlns:p="http://schemas.openxmlformats.org/presentationml/2006/main">
+  <p:cSld>
+    <p:spTree>
+      <p:nvGrpSpPr>
+        <p:cNvPr id="1" name=""/>
+        <p:cNvGrpSpPr/>
+        <p:nvPr/>
+      </p:nvGrpSpPr>
+      <p:grpSpPr>
+        <a:xfrm>
+          <a:off x="0" y="0"/>
+          <a:ext cx="0" cy="0"/>
+          <a:chOff x="0" y="0"/>
+          <a:chExt cx="0" cy="0"/>
+        </a:xfrm>
+      </p:grpSpPr>
+      <p:sp>
+        <p:nvSpPr>
+          <p:cNvPr id="2" name="Título 1"/>
+          <p:cNvSpPr>
+            <a:spLocks noGrp="1"/>
+          </p:cNvSpPr>
+          <p:nvPr>
+            <p:ph type="title"/>
+          </p:nvPr>
+        </p:nvSpPr>
+        <p:spPr/>
+        <p:txBody>
+          <a:bodyPr/>
+          <a:lstStyle/>
+          <a:p>
+            <a:pPr algn="ctr"/>
+            <a:r>
+              <a:rPr lang="es-MX" dirty="0" smtClean="0"/>
+              <a:t>OBJETIVOS</a:t>
+            </a:r>
+            <a:endParaRPr lang="es-MX" dirty="0"/>
+          </a:p>
+        </p:txBody>
+      </p:sp>
+      <p:sp>
+        <p:nvSpPr>
+          <p:cNvPr id="3" name="Marcador de contenido 2"/>
+          <p:cNvSpPr>
+            <a:spLocks noGrp="1"/>
+          </p:cNvSpPr>
+          <p:nvPr>
+            <p:ph idx="1"/>
+          </p:nvPr>
+        </p:nvSpPr>
+        <p:spPr>
+          <a:xfrm>
+            <a:off x="1094509" y="2171700"/>
+            <a:ext cx="10460183" cy="3674918"/>
+          </a:xfrm>
+        </p:spPr>
+        <p:txBody>
+          <a:bodyPr>
+            <a:normAutofit/>
+          </a:bodyPr>
+          <a:lstStyle/>
+          <a:p>
+            <a:pPr marL="0" indent="0" algn="ctr">
+              <a:buNone/>
+            </a:pPr>
+            <a:r>
+              <a:rPr lang="es-MX" b="1" dirty="0" smtClean="0"/>
+              <a:t>General</a:t>
+            </a:r>
+            <a:r>
+              <a:rPr lang="es-MX" dirty="0" smtClean="0"/>
+              <a:t>:</a:t>
+            </a:r>
+          </a:p>
+          <a:p>
+            <a:pPr marL="0" indent="0" algn="ctr">
+              <a:buNone/>
+            </a:pPr>
+            <a:r>
+              <a:rPr lang="es-MX" dirty="0"/>
+              <a:t>Administrar el proyecto de la aplicación Móvil de la Panadería San Pedro </a:t>
+            </a:r>
+            <a:endParaRPr lang="es-MX" dirty="0" smtClean="0"/>
+          </a:p>
+          <a:p>
+            <a:pPr marL="0" indent="0" algn="ctr">
+              <a:buNone/>
+            </a:pPr>
+            <a:r>
+              <a:rPr lang="es-MX" dirty="0" smtClean="0"/>
+              <a:t>gestionando </a:t>
+            </a:r>
+            <a:r>
+              <a:rPr lang="es-MX" dirty="0"/>
+              <a:t>en sus diferentes etapas de desarrollo, llevando acabo la realización </a:t>
+            </a:r>
+            <a:r>
+              <a:rPr lang="es-MX" dirty="0" smtClean="0"/>
+              <a:t>de</a:t>
+            </a:r>
+          </a:p>
+          <a:p>
+            <a:pPr marL="0" indent="0" algn="ctr">
+              <a:buNone/>
+            </a:pPr>
+            <a:r>
+              <a:rPr lang="es-MX" dirty="0" smtClean="0"/>
+              <a:t> </a:t>
+            </a:r>
+            <a:r>
+              <a:rPr lang="es-MX" dirty="0"/>
+              <a:t>documentos </a:t>
+            </a:r>
+            <a:r>
+              <a:rPr lang="es-MX" dirty="0" smtClean="0"/>
+              <a:t>la </a:t>
+            </a:r>
+            <a:r>
+              <a:rPr lang="es-MX" dirty="0"/>
+              <a:t>cual servirá de apoyo para el </a:t>
+            </a:r>
+            <a:r>
+              <a:rPr lang="es-MX" dirty="0" smtClean="0"/>
+              <a:t>desarrollo de la misma, durando en un periodo</a:t>
+            </a:r>
+          </a:p>
+          <a:p>
+            <a:pPr marL="0" indent="0" algn="ctr">
+              <a:buNone/>
+            </a:pPr>
+            <a:r>
+              <a:rPr lang="es-MX" dirty="0" smtClean="0"/>
+              <a:t>total de </a:t>
+            </a:r>
+            <a:r>
+              <a:rPr lang="es-MX" dirty="0"/>
+              <a:t>8 </a:t>
+            </a:r>
+            <a:r>
+              <a:rPr lang="es-MX" dirty="0" smtClean="0"/>
+              <a:t>meses, iniciando en </a:t>
+            </a:r>
+            <a:r>
+              <a:rPr lang="es-MX" dirty="0"/>
+              <a:t>el mes de enero y </a:t>
+            </a:r>
+            <a:r>
+              <a:rPr lang="es-MX" dirty="0" smtClean="0"/>
+              <a:t>finalizando </a:t>
+            </a:r>
+            <a:r>
+              <a:rPr lang="es-MX" dirty="0"/>
+              <a:t>en el mes de agosto</a:t>
+            </a:r>
+            <a:r>
+              <a:rPr lang="es-MX" dirty="0" smtClean="0"/>
+              <a:t>.</a:t>
+            </a:r>
+          </a:p>
+          <a:p>
+            <a:pPr marL="0" indent="0" algn="ctr">
+              <a:buNone/>
+            </a:pPr>
+            <a:r>
+              <a:rPr lang="es-MX" dirty="0" smtClean="0"/>
+              <a:t>El proyecto será guiado usando la metodología del PMBOK para establecer bases </a:t>
+            </a:r>
+          </a:p>
+          <a:p>
+            <a:pPr marL="0" indent="0" algn="ctr">
+              <a:buNone/>
+            </a:pPr>
+            <a:r>
+              <a:rPr lang="es-MX" dirty="0" smtClean="0"/>
+              <a:t>en el inicio, planeación, control, seguimiento, tiempos, costos  y fin del proyecto. </a:t>
+            </a:r>
+          </a:p>
+          <a:p>
+            <a:pPr marL="0" indent="0" algn="ctr">
+              <a:buNone/>
+            </a:pPr>
+            <a:endParaRPr lang="es-MX" dirty="0"/>
+          </a:p>
+          <a:p>
+            <a:pPr marL="0" indent="0" algn="ctr">
+              <a:buNone/>
+            </a:pPr>
+            <a:endParaRPr lang="es-MX" dirty="0" smtClean="0"/>
+          </a:p>
+          <a:p>
+            <a:pPr marL="0" indent="0">
+              <a:buNone/>
+            </a:pPr>
+            <a:endParaRPr lang="es-MX" dirty="0"/>
+          </a:p>
+        </p:txBody>
+      </p:sp>
+    </p:spTree>
+    <p:extLst>
+      <p:ext uri="{BB962C8B-B14F-4D97-AF65-F5344CB8AC3E}">
+        <p14:creationId xmlns:p14="http://schemas.microsoft.com/office/powerpoint/2010/main" val="1551424684"/>
+      </p:ext>
+    </p:extLst>
+  </p:cSld>
+  <p:clrMapOvr>
+    <a:masterClrMapping/>
+  </p:clrMapOvr>
+</p:sld>
+</file>
+
+<file path=ppt/slides/slide8.xml><?xml version="1.0" encoding="utf-8"?>
+<p:sld xmlns:a="http://schemas.openxmlformats.org/drawingml/2006/main" xmlns:r="http://schemas.openxmlformats.org/officeDocument/2006/relationships" xmlns:p="http://schemas.openxmlformats.org/presentationml/2006/main">
+  <p:cSld>
+    <p:spTree>
+      <p:nvGrpSpPr>
+        <p:cNvPr id="1" name=""/>
+        <p:cNvGrpSpPr/>
+        <p:nvPr/>
+      </p:nvGrpSpPr>
+      <p:grpSpPr>
+        <a:xfrm>
+          <a:off x="0" y="0"/>
+          <a:ext cx="0" cy="0"/>
+          <a:chOff x="0" y="0"/>
+          <a:chExt cx="0" cy="0"/>
+        </a:xfrm>
+      </p:grpSpPr>
+      <p:sp>
+        <p:nvSpPr>
+          <p:cNvPr id="4" name="Marcador de contenido 2"/>
+          <p:cNvSpPr txBox="1">
+            <a:spLocks noGrp="1"/>
+          </p:cNvSpPr>
+          <p:nvPr>
+            <p:ph idx="1"/>
+          </p:nvPr>
+        </p:nvSpPr>
+        <p:spPr>
+          <a:xfrm>
+            <a:off x="1685636" y="2055091"/>
+            <a:ext cx="9601200" cy="3581400"/>
+          </a:xfrm>
+          <a:prstGeom prst="rect">
+            <a:avLst/>
+          </a:prstGeom>
+        </p:spPr>
+        <p:txBody>
+          <a:bodyPr vert="horz" lIns="91440" tIns="45720" rIns="91440" bIns="45720" rtlCol="0">
+            <a:normAutofit/>
+          </a:bodyPr>
+          <a:lstStyle>
+            <a:lvl1pPr marL="384048" indent="-384048" algn="l" defTabSz="914400" rtl="0" eaLnBrk="1" latinLnBrk="0" hangingPunct="1">
+              <a:lnSpc>
+                <a:spcPct val="94000"/>
+              </a:lnSpc>
+              <a:spcBef>
+                <a:spcPts val="1000"/>
+              </a:spcBef>
+              <a:spcAft>
+                <a:spcPts val="200"/>
+              </a:spcAft>
+              <a:buFont typeface="Franklin Gothic Book" panose="020B0503020102020204" pitchFamily="34" charset="0"/>
+              <a:buChar char="■"/>
+              <a:defRPr sz="2000" kern="1200" baseline="0">
+                <a:solidFill>
+                  <a:schemeClr val="tx2"/>
+                </a:solidFill>
+                <a:latin typeface="+mn-lt"/>
+                <a:ea typeface="+mn-ea"/>
+                <a:cs typeface="+mn-cs"/>
+              </a:defRPr>
+            </a:lvl1pPr>
+            <a:lvl2pPr marL="914400" indent="-384048" algn="l" defTabSz="914400" rtl="0" eaLnBrk="1" latinLnBrk="0" hangingPunct="1">
+              <a:lnSpc>
+                <a:spcPct val="94000"/>
+              </a:lnSpc>
+              <a:spcBef>
+                <a:spcPts val="500"/>
+              </a:spcBef>
+              <a:spcAft>
+                <a:spcPts val="200"/>
+              </a:spcAft>
+              <a:buFont typeface="Franklin Gothic Book" panose="020B0503020102020204" pitchFamily="34" charset="0"/>
+              <a:buChar char="–"/>
+              <a:defRPr sz="2000" i="1" kern="1200" baseline="0">
+                <a:solidFill>
+                  <a:schemeClr val="tx2"/>
+                </a:solidFill>
+                <a:latin typeface="+mn-lt"/>
+                <a:ea typeface="+mn-ea"/>
+                <a:cs typeface="+mn-cs"/>
+              </a:defRPr>
+            </a:lvl2pPr>
+            <a:lvl3pPr marL="1371600" indent="-384048" algn="l" defTabSz="914400" rtl="0" eaLnBrk="1" latinLnBrk="0" hangingPunct="1">
+              <a:lnSpc>
+                <a:spcPct val="94000"/>
+              </a:lnSpc>
+              <a:spcBef>
+                <a:spcPts val="500"/>
+              </a:spcBef>
+              <a:spcAft>
+                <a:spcPts val="200"/>
+              </a:spcAft>
+              <a:buFont typeface="Franklin Gothic Book" panose="020B0503020102020204" pitchFamily="34" charset="0"/>
+              <a:buChar char="■"/>
+              <a:defRPr sz="1800" kern="1200" baseline="0">
+                <a:solidFill>
+                  <a:schemeClr val="tx2"/>
+                </a:solidFill>
+                <a:latin typeface="+mn-lt"/>
+                <a:ea typeface="+mn-ea"/>
+                <a:cs typeface="+mn-cs"/>
+              </a:defRPr>
+            </a:lvl3pPr>
+            <a:lvl4pPr marL="1828800" indent="-384048" algn="l" defTabSz="914400" rtl="0" eaLnBrk="1" latinLnBrk="0" hangingPunct="1">
+              <a:lnSpc>
+                <a:spcPct val="94000"/>
+              </a:lnSpc>
+              <a:spcBef>
+                <a:spcPts val="500"/>
+              </a:spcBef>
+              <a:spcAft>
+                <a:spcPts val="200"/>
+              </a:spcAft>
+              <a:buFont typeface="Franklin Gothic Book" panose="020B0503020102020204" pitchFamily="34" charset="0"/>
+              <a:buChar char="–"/>
+              <a:defRPr sz="1800" i="1" kern="1200" baseline="0">
+                <a:solidFill>
+                  <a:schemeClr val="tx2"/>
+                </a:solidFill>
+                <a:latin typeface="+mn-lt"/>
+                <a:ea typeface="+mn-ea"/>
+                <a:cs typeface="+mn-cs"/>
+              </a:defRPr>
+            </a:lvl4pPr>
+            <a:lvl5pPr marL="2286000" indent="-384048" algn="l" defTabSz="914400" rtl="0" eaLnBrk="1" latinLnBrk="0" hangingPunct="1">
+              <a:lnSpc>
+                <a:spcPct val="94000"/>
+              </a:lnSpc>
+              <a:spcBef>
+                <a:spcPts val="500"/>
+              </a:spcBef>
+              <a:spcAft>
+                <a:spcPts val="200"/>
+              </a:spcAft>
+              <a:buFont typeface="Franklin Gothic Book" panose="020B0503020102020204" pitchFamily="34" charset="0"/>
+              <a:buChar char="■"/>
+              <a:defRPr sz="1600" kern="1200" baseline="0">
+                <a:solidFill>
+                  <a:schemeClr val="tx2"/>
+                </a:solidFill>
+                <a:latin typeface="+mn-lt"/>
+                <a:ea typeface="+mn-ea"/>
+                <a:cs typeface="+mn-cs"/>
+              </a:defRPr>
+            </a:lvl5pPr>
+            <a:lvl6pPr marL="2743200" indent="-384048" algn="l" defTabSz="914400" rtl="0" eaLnBrk="1" latinLnBrk="0" hangingPunct="1">
+              <a:lnSpc>
+                <a:spcPct val="94000"/>
+              </a:lnSpc>
+              <a:spcBef>
+                <a:spcPts val="500"/>
+              </a:spcBef>
+              <a:spcAft>
+                <a:spcPts val="200"/>
+              </a:spcAft>
+              <a:buFont typeface="Franklin Gothic Book" panose="020B0503020102020204" pitchFamily="34" charset="0"/>
+              <a:buChar char="–"/>
+              <a:defRPr sz="1600" i="1" kern="1200" baseline="0">
+                <a:solidFill>
+                  <a:schemeClr val="tx2"/>
+                </a:solidFill>
+                <a:latin typeface="+mn-lt"/>
+                <a:ea typeface="+mn-ea"/>
+                <a:cs typeface="+mn-cs"/>
+              </a:defRPr>
+            </a:lvl6pPr>
+            <a:lvl7pPr marL="3200400" indent="-384048" algn="l" defTabSz="914400" rtl="0" eaLnBrk="1" latinLnBrk="0" hangingPunct="1">
+              <a:lnSpc>
+                <a:spcPct val="94000"/>
+              </a:lnSpc>
+              <a:spcBef>
+                <a:spcPts val="500"/>
+              </a:spcBef>
+              <a:spcAft>
+                <a:spcPts val="200"/>
+              </a:spcAft>
+              <a:buFont typeface="Franklin Gothic Book" panose="020B0503020102020204" pitchFamily="34" charset="0"/>
+              <a:buChar char="■"/>
+              <a:defRPr sz="1400" kern="1200" baseline="0">
+                <a:solidFill>
+                  <a:schemeClr val="tx2"/>
+                </a:solidFill>
+                <a:latin typeface="+mn-lt"/>
+                <a:ea typeface="+mn-ea"/>
+                <a:cs typeface="+mn-cs"/>
+              </a:defRPr>
+            </a:lvl7pPr>
+            <a:lvl8pPr marL="3657600" indent="-384048" algn="l" defTabSz="914400" rtl="0" eaLnBrk="1" latinLnBrk="0" hangingPunct="1">
+              <a:lnSpc>
+                <a:spcPct val="94000"/>
+              </a:lnSpc>
+              <a:spcBef>
+                <a:spcPts val="500"/>
+              </a:spcBef>
+              <a:spcAft>
+                <a:spcPts val="200"/>
+              </a:spcAft>
+              <a:buFont typeface="Franklin Gothic Book" panose="020B0503020102020204" pitchFamily="34" charset="0"/>
+              <a:buChar char="–"/>
+              <a:defRPr sz="1400" i="1" kern="1200" baseline="0">
+                <a:solidFill>
+                  <a:schemeClr val="tx2"/>
+                </a:solidFill>
+                <a:latin typeface="+mn-lt"/>
+                <a:ea typeface="+mn-ea"/>
+                <a:cs typeface="+mn-cs"/>
+              </a:defRPr>
+            </a:lvl8pPr>
+            <a:lvl9pPr marL="4114800" indent="-384048" algn="l" defTabSz="914400" rtl="0" eaLnBrk="1" latinLnBrk="0" hangingPunct="1">
+              <a:lnSpc>
+                <a:spcPct val="94000"/>
+              </a:lnSpc>
+              <a:spcBef>
+                <a:spcPts val="500"/>
+              </a:spcBef>
+              <a:spcAft>
+                <a:spcPts val="200"/>
+              </a:spcAft>
+              <a:buFont typeface="Franklin Gothic Book" panose="020B0503020102020204" pitchFamily="34" charset="0"/>
+              <a:buChar char="■"/>
+              <a:defRPr sz="1400" kern="1200" baseline="0">
+                <a:solidFill>
+                  <a:schemeClr val="tx2"/>
+                </a:solidFill>
+                <a:latin typeface="+mn-lt"/>
+                <a:ea typeface="+mn-ea"/>
+                <a:cs typeface="+mn-cs"/>
+              </a:defRPr>
+            </a:lvl9pPr>
+          </a:lstStyle>
+          <a:p>
+            <a:pPr marL="0" indent="0" algn="ctr">
+              <a:buFont typeface="Franklin Gothic Book" panose="020B0503020102020204" pitchFamily="34" charset="0"/>
+              <a:buNone/>
+            </a:pPr>
+            <a:r>
+              <a:rPr lang="es-MX" b="1" dirty="0" smtClean="0"/>
+              <a:t>Especifico</a:t>
+            </a:r>
+            <a:r>
+              <a:rPr lang="es-MX" dirty="0" smtClean="0"/>
+              <a:t>:</a:t>
+            </a:r>
+          </a:p>
+          <a:p>
+            <a:r>
+              <a:rPr lang="es-MX" dirty="0" smtClean="0"/>
+              <a:t>La </a:t>
+            </a:r>
+            <a:r>
+              <a:rPr lang="es-MX" dirty="0"/>
+              <a:t>aplicación móvil </a:t>
+            </a:r>
+            <a:r>
+              <a:rPr lang="es-MX" dirty="0" smtClean="0"/>
+              <a:t>controlará las </a:t>
+            </a:r>
+            <a:r>
+              <a:rPr lang="es-MX" dirty="0"/>
+              <a:t>entradas, procesos y </a:t>
+            </a:r>
+            <a:r>
+              <a:rPr lang="es-MX" dirty="0" smtClean="0"/>
+              <a:t>salidas de los módulos.</a:t>
+            </a:r>
+          </a:p>
+          <a:p>
+            <a:r>
+              <a:rPr lang="es-MX" dirty="0" smtClean="0"/>
+              <a:t>La administración del proyecto se guiará según la metodología PMBOK v6.0.</a:t>
+            </a:r>
+            <a:endParaRPr lang="es-MX" dirty="0"/>
+          </a:p>
+          <a:p>
+            <a:r>
+              <a:rPr lang="es-MX" dirty="0"/>
+              <a:t>El proyecto </a:t>
+            </a:r>
+            <a:r>
+              <a:rPr lang="es-MX" dirty="0" smtClean="0"/>
+              <a:t>tendrá un costo total de $ </a:t>
+            </a:r>
+            <a:r>
+              <a:rPr lang="es-MX" dirty="0"/>
+              <a:t>$</a:t>
+            </a:r>
+            <a:r>
+              <a:rPr lang="es-MX" dirty="0" smtClean="0"/>
+              <a:t>106,128.72 y durará 8 meses.</a:t>
+            </a:r>
+            <a:endParaRPr lang="es-MX" dirty="0"/>
+          </a:p>
+          <a:p>
+            <a:pPr marL="0" indent="0" algn="ctr">
+              <a:buFont typeface="Franklin Gothic Book" panose="020B0503020102020204" pitchFamily="34" charset="0"/>
+              <a:buNone/>
+            </a:pPr>
+            <a:r>
+              <a:rPr lang="es-MX" dirty="0" smtClean="0"/>
+              <a:t>.</a:t>
+            </a:r>
+          </a:p>
+          <a:p>
+            <a:pPr marL="0" indent="0" algn="ctr">
+              <a:buFont typeface="Franklin Gothic Book" panose="020B0503020102020204" pitchFamily="34" charset="0"/>
+              <a:buNone/>
+            </a:pPr>
+            <a:endParaRPr lang="es-MX" dirty="0" smtClean="0"/>
+          </a:p>
+          <a:p>
+            <a:pPr marL="0" indent="0">
+              <a:buFont typeface="Franklin Gothic Book" panose="020B0503020102020204" pitchFamily="34" charset="0"/>
+              <a:buNone/>
+            </a:pPr>
+            <a:endParaRPr lang="es-MX" dirty="0"/>
+          </a:p>
+        </p:txBody>
+      </p:sp>
+    </p:spTree>
+    <p:extLst>
+      <p:ext uri="{BB962C8B-B14F-4D97-AF65-F5344CB8AC3E}">
+        <p14:creationId xmlns:p14="http://schemas.microsoft.com/office/powerpoint/2010/main" val="109640754"/>
+      </p:ext>
+    </p:extLst>
+  </p:cSld>
+  <p:clrMapOvr>
+    <a:masterClrMapping/>
+  </p:clrMapOvr>
+</p:sld>
+</file>
+
+<file path=ppt/slides/slide9.xml><?xml version="1.0" encoding="utf-8"?>
+<p:sld xmlns:a="http://schemas.openxmlformats.org/drawingml/2006/main" xmlns:r="http://schemas.openxmlformats.org/officeDocument/2006/relationships" xmlns:p="http://schemas.openxmlformats.org/presentationml/2006/main">
+  <p:cSld>
+    <p:spTree>
+      <p:nvGrpSpPr>
+        <p:cNvPr id="1" name=""/>
+        <p:cNvGrpSpPr/>
+        <p:nvPr/>
+      </p:nvGrpSpPr>
+      <p:grpSpPr>
+        <a:xfrm>
+          <a:off x="0" y="0"/>
+          <a:ext cx="0" cy="0"/>
+          <a:chOff x="0" y="0"/>
+          <a:chExt cx="0" cy="0"/>
+        </a:xfrm>
+      </p:grpSpPr>
+      <p:sp>
+        <p:nvSpPr>
+          <p:cNvPr id="2" name="Título 1"/>
+          <p:cNvSpPr>
+            <a:spLocks noGrp="1"/>
+          </p:cNvSpPr>
+          <p:nvPr>
+            <p:ph type="title"/>
+          </p:nvPr>
+        </p:nvSpPr>
+        <p:spPr/>
+        <p:txBody>
+          <a:bodyPr/>
+          <a:lstStyle/>
+          <a:p>
+            <a:pPr algn="ctr"/>
+            <a:r>
+              <a:rPr lang="es-MX" dirty="0" smtClean="0"/>
+              <a:t>ALCANCES</a:t>
+            </a:r>
+            <a:endParaRPr lang="es-MX" dirty="0"/>
+          </a:p>
+        </p:txBody>
+      </p:sp>
+      <p:sp>
+        <p:nvSpPr>
+          <p:cNvPr id="3" name="Marcador de contenido 2"/>
+          <p:cNvSpPr>
+            <a:spLocks noGrp="1"/>
+          </p:cNvSpPr>
+          <p:nvPr>
+            <p:ph idx="1"/>
+          </p:nvPr>
+        </p:nvSpPr>
+        <p:spPr>
+          <a:xfrm>
+            <a:off x="1565563" y="2171700"/>
+            <a:ext cx="10386291" cy="3581400"/>
+          </a:xfrm>
+        </p:spPr>
+        <p:txBody>
+          <a:bodyPr/>
+          <a:lstStyle/>
+          <a:p>
+            <a:pPr marL="0" indent="0" algn="ctr">
+              <a:buNone/>
+            </a:pPr>
+            <a:r>
+              <a:rPr lang="es-MX" dirty="0"/>
+              <a:t>Administrar un proyecto que consiste en el desarrollo de una aplicación </a:t>
+            </a:r>
+            <a:r>
+              <a:rPr lang="es-MX" dirty="0" smtClean="0"/>
+              <a:t>móvil, siguiendo la</a:t>
+            </a:r>
+          </a:p>
+          <a:p>
+            <a:pPr marL="0" indent="0" algn="ctr">
+              <a:buNone/>
+            </a:pPr>
+            <a:r>
+              <a:rPr lang="es-MX" dirty="0" smtClean="0"/>
+              <a:t>metodología </a:t>
+            </a:r>
+            <a:r>
+              <a:rPr lang="es-MX" dirty="0"/>
+              <a:t>PMBOK v6.0 siendo una guía para establecer </a:t>
+            </a:r>
+            <a:r>
+              <a:rPr lang="es-MX" dirty="0"/>
+              <a:t>bases </a:t>
+            </a:r>
+            <a:r>
+              <a:rPr lang="es-MX" dirty="0" smtClean="0"/>
+              <a:t>en </a:t>
+            </a:r>
+            <a:r>
+              <a:rPr lang="es-MX" dirty="0"/>
+              <a:t>el inicio, </a:t>
+            </a:r>
+            <a:r>
+              <a:rPr lang="es-MX" dirty="0" smtClean="0"/>
+              <a:t>planeación,</a:t>
+            </a:r>
+          </a:p>
+          <a:p>
+            <a:pPr marL="0" indent="0" algn="ctr">
+              <a:buNone/>
+            </a:pPr>
+            <a:r>
+              <a:rPr lang="es-MX" dirty="0" smtClean="0"/>
+              <a:t>control</a:t>
+            </a:r>
+            <a:r>
+              <a:rPr lang="es-MX" dirty="0"/>
+              <a:t>, seguimiento, tiempos, costos  y fin del </a:t>
+            </a:r>
+            <a:r>
+              <a:rPr lang="es-MX" dirty="0" smtClean="0"/>
+              <a:t>proyecto. Bajo esta planeación se</a:t>
+            </a:r>
+          </a:p>
+          <a:p>
+            <a:pPr marL="0" indent="0" algn="ctr">
+              <a:buNone/>
+            </a:pPr>
+            <a:r>
+              <a:rPr lang="es-MX" dirty="0" smtClean="0"/>
+              <a:t>Incluyen documentos tales como Project </a:t>
+            </a:r>
+            <a:r>
+              <a:rPr lang="es-MX" dirty="0" err="1" smtClean="0"/>
+              <a:t>Charter</a:t>
+            </a:r>
+            <a:r>
+              <a:rPr lang="es-MX" dirty="0" smtClean="0"/>
+              <a:t>, </a:t>
+            </a:r>
+            <a:r>
+              <a:rPr lang="es-MX" dirty="0" err="1" smtClean="0"/>
+              <a:t>Stakeholders</a:t>
+            </a:r>
+            <a:r>
+              <a:rPr lang="es-MX" dirty="0" smtClean="0"/>
+              <a:t>, Diagrama de Gantt, etc.</a:t>
+            </a:r>
+          </a:p>
+          <a:p>
+            <a:pPr marL="0" indent="0" algn="ctr">
+              <a:buNone/>
+            </a:pPr>
+            <a:r>
+              <a:rPr lang="es-MX" dirty="0" smtClean="0"/>
+              <a:t>La aplicación Móvil tendrá la finalidad de aportar a la empresa </a:t>
+            </a:r>
+            <a:r>
+              <a:rPr lang="es-MX" b="1" dirty="0" smtClean="0"/>
+              <a:t>Panadería </a:t>
+            </a:r>
+          </a:p>
+          <a:p>
+            <a:pPr marL="0" indent="0" algn="ctr">
+              <a:buNone/>
+            </a:pPr>
+            <a:r>
+              <a:rPr lang="es-MX" b="1" dirty="0" smtClean="0"/>
+              <a:t>San Pedro </a:t>
+            </a:r>
+            <a:r>
+              <a:rPr lang="es-MX" dirty="0" smtClean="0"/>
+              <a:t>control y administración a los módulos y departamentos existentes.</a:t>
+            </a:r>
+          </a:p>
+          <a:p>
+            <a:pPr marL="0" indent="0" algn="ctr">
+              <a:buNone/>
+            </a:pPr>
+            <a:endParaRPr lang="es-MX" dirty="0" smtClean="0"/>
+          </a:p>
+          <a:p>
+            <a:pPr marL="0" indent="0" algn="ctr">
+              <a:buNone/>
+            </a:pPr>
+            <a:endParaRPr lang="es-MX" dirty="0"/>
+          </a:p>
+        </p:txBody>
+      </p:sp>
+    </p:spTree>
+    <p:extLst>
+      <p:ext uri="{BB962C8B-B14F-4D97-AF65-F5344CB8AC3E}">
+        <p14:creationId xmlns:p14="http://schemas.microsoft.com/office/powerpoint/2010/main" val="511744383"/>
       </p:ext>
     </p:extLst>
   </p:cSld>

</xml_diff>